<commit_message>
VISUALIZACION: PEC3 - finalizada
</commit_message>
<xml_diff>
--- a/2021-22/PrimerSemestre/Visualizacion/PEC3/Storytelling.pptx
+++ b/2021-22/PrimerSemestre/Visualizacion/PEC3/Storytelling.pptx
@@ -6,19 +6,21 @@
   </p:sldMasterIdLst>
   <p:sldIdLst>
     <p:sldId id="256" r:id="rId2"/>
-    <p:sldId id="258" r:id="rId3"/>
-    <p:sldId id="279" r:id="rId4"/>
+    <p:sldId id="279" r:id="rId3"/>
+    <p:sldId id="280" r:id="rId4"/>
     <p:sldId id="281" r:id="rId5"/>
-    <p:sldId id="280" r:id="rId6"/>
-    <p:sldId id="282" r:id="rId7"/>
-    <p:sldId id="283" r:id="rId8"/>
-    <p:sldId id="284" r:id="rId9"/>
-    <p:sldId id="285" r:id="rId10"/>
-    <p:sldId id="286" r:id="rId11"/>
-    <p:sldId id="287" r:id="rId12"/>
-    <p:sldId id="288" r:id="rId13"/>
-    <p:sldId id="289" r:id="rId14"/>
-    <p:sldId id="278" r:id="rId15"/>
+    <p:sldId id="282" r:id="rId6"/>
+    <p:sldId id="283" r:id="rId7"/>
+    <p:sldId id="284" r:id="rId8"/>
+    <p:sldId id="285" r:id="rId9"/>
+    <p:sldId id="286" r:id="rId10"/>
+    <p:sldId id="287" r:id="rId11"/>
+    <p:sldId id="288" r:id="rId12"/>
+    <p:sldId id="289" r:id="rId13"/>
+    <p:sldId id="290" r:id="rId14"/>
+    <p:sldId id="291" r:id="rId15"/>
+    <p:sldId id="292" r:id="rId16"/>
+    <p:sldId id="278" r:id="rId17"/>
   </p:sldIdLst>
   <p:sldSz cx="12192000" cy="6858000"/>
   <p:notesSz cx="6858000" cy="9144000"/>
@@ -307,7 +309,7 @@
             <a:fld id="{87DE6118-2437-4B30-8E3C-4D2BE6020583}" type="datetimeFigureOut">
               <a:rPr lang="en-US" dirty="0"/>
               <a:pPr/>
-              <a:t>11/15/2021</a:t>
+              <a:t>12/6/2021</a:t>
             </a:fld>
             <a:endParaRPr lang="en-US" dirty="0"/>
           </a:p>
@@ -633,7 +635,7 @@
           <a:p>
             <a:fld id="{87DE6118-2437-4B30-8E3C-4D2BE6020583}" type="datetimeFigureOut">
               <a:rPr lang="en-US" dirty="0"/>
-              <a:t>11/15/2021</a:t>
+              <a:t>12/6/2021</a:t>
             </a:fld>
             <a:endParaRPr lang="en-US" dirty="0"/>
           </a:p>
@@ -808,7 +810,7 @@
           <a:p>
             <a:fld id="{87DE6118-2437-4B30-8E3C-4D2BE6020583}" type="datetimeFigureOut">
               <a:rPr lang="en-US" dirty="0"/>
-              <a:t>11/15/2021</a:t>
+              <a:t>12/6/2021</a:t>
             </a:fld>
             <a:endParaRPr lang="en-US" dirty="0"/>
           </a:p>
@@ -973,7 +975,7 @@
           <a:p>
             <a:fld id="{87DE6118-2437-4B30-8E3C-4D2BE6020583}" type="datetimeFigureOut">
               <a:rPr lang="en-US" dirty="0"/>
-              <a:t>11/15/2021</a:t>
+              <a:t>12/6/2021</a:t>
             </a:fld>
             <a:endParaRPr lang="en-US" dirty="0"/>
           </a:p>
@@ -1246,7 +1248,7 @@
             <a:fld id="{87DE6118-2437-4B30-8E3C-4D2BE6020583}" type="datetimeFigureOut">
               <a:rPr lang="en-US" dirty="0"/>
               <a:pPr/>
-              <a:t>11/15/2021</a:t>
+              <a:t>12/6/2021</a:t>
             </a:fld>
             <a:endParaRPr lang="en-US" dirty="0"/>
           </a:p>
@@ -1636,7 +1638,7 @@
           <a:p>
             <a:fld id="{87DE6118-2437-4B30-8E3C-4D2BE6020583}" type="datetimeFigureOut">
               <a:rPr lang="en-US" dirty="0"/>
-              <a:t>11/15/2021</a:t>
+              <a:t>12/6/2021</a:t>
             </a:fld>
             <a:endParaRPr lang="en-US" dirty="0"/>
           </a:p>
@@ -2108,7 +2110,7 @@
           <a:p>
             <a:fld id="{87DE6118-2437-4B30-8E3C-4D2BE6020583}" type="datetimeFigureOut">
               <a:rPr lang="en-US" dirty="0"/>
-              <a:t>11/15/2021</a:t>
+              <a:t>12/6/2021</a:t>
             </a:fld>
             <a:endParaRPr lang="en-US" dirty="0"/>
           </a:p>
@@ -2221,7 +2223,7 @@
           <a:p>
             <a:fld id="{87DE6118-2437-4B30-8E3C-4D2BE6020583}" type="datetimeFigureOut">
               <a:rPr lang="en-US" dirty="0"/>
-              <a:t>11/15/2021</a:t>
+              <a:t>12/6/2021</a:t>
             </a:fld>
             <a:endParaRPr lang="en-US" dirty="0"/>
           </a:p>
@@ -2311,7 +2313,7 @@
           <a:p>
             <a:fld id="{87DE6118-2437-4B30-8E3C-4D2BE6020583}" type="datetimeFigureOut">
               <a:rPr lang="en-US" dirty="0"/>
-              <a:t>11/15/2021</a:t>
+              <a:t>12/6/2021</a:t>
             </a:fld>
             <a:endParaRPr lang="en-US" dirty="0"/>
           </a:p>
@@ -2653,7 +2655,7 @@
             <a:fld id="{87DE6118-2437-4B30-8E3C-4D2BE6020583}" type="datetimeFigureOut">
               <a:rPr lang="en-US" dirty="0"/>
               <a:pPr/>
-              <a:t>11/15/2021</a:t>
+              <a:t>12/6/2021</a:t>
             </a:fld>
             <a:endParaRPr lang="en-US" dirty="0"/>
           </a:p>
@@ -3038,7 +3040,7 @@
             <a:fld id="{87DE6118-2437-4B30-8E3C-4D2BE6020583}" type="datetimeFigureOut">
               <a:rPr lang="en-US" dirty="0"/>
               <a:pPr/>
-              <a:t>11/15/2021</a:t>
+              <a:t>12/6/2021</a:t>
             </a:fld>
             <a:endParaRPr lang="en-US" dirty="0"/>
           </a:p>
@@ -3313,7 +3315,7 @@
             <a:fld id="{87DE6118-2437-4B30-8E3C-4D2BE6020583}" type="datetimeFigureOut">
               <a:rPr lang="en-US" dirty="0"/>
               <a:pPr/>
-              <a:t>11/15/2021</a:t>
+              <a:t>12/6/2021</a:t>
             </a:fld>
             <a:endParaRPr lang="en-US" dirty="0"/>
           </a:p>
@@ -3849,7 +3851,7 @@
           <a:p>
             <a:r>
               <a:rPr lang="es-ES" dirty="0"/>
-              <a:t>Técnicas DE VISUALIZACIÓN DE DATOS</a:t>
+              <a:t>Visualización de datos storytelling</a:t>
             </a:r>
           </a:p>
         </p:txBody>
@@ -3946,7 +3948,7 @@
           <p:cNvPr id="2" name="Título 1">
             <a:extLst>
               <a:ext uri="{FF2B5EF4-FFF2-40B4-BE49-F238E27FC236}">
-                <a16:creationId xmlns:a16="http://schemas.microsoft.com/office/drawing/2014/main" id="{DAA4DABF-1EB7-47D6-B449-C6454560C629}"/>
+                <a16:creationId xmlns:a16="http://schemas.microsoft.com/office/drawing/2014/main" id="{5E6A303E-5EBE-4DDA-B957-F88A271C06EC}"/>
               </a:ext>
             </a:extLst>
           </p:cNvPr>
@@ -3957,66 +3959,79 @@
             <p:ph type="title"/>
           </p:nvPr>
         </p:nvSpPr>
-        <p:spPr>
-          <a:xfrm>
-            <a:off x="1371600" y="685800"/>
-            <a:ext cx="9601200" cy="912412"/>
-          </a:xfrm>
-        </p:spPr>
-        <p:txBody>
-          <a:bodyPr>
-            <a:normAutofit/>
-          </a:bodyPr>
+        <p:spPr/>
+        <p:txBody>
+          <a:bodyPr/>
           <a:lstStyle/>
           <a:p>
             <a:r>
               <a:rPr lang="es-ES" dirty="0"/>
-              <a:t>Gráfico de isotipo</a:t>
-            </a:r>
-            <a:br>
-              <a:rPr lang="es-ES" dirty="0"/>
-            </a:br>
-            <a:r>
-              <a:rPr lang="es-ES" sz="1600" i="1" dirty="0"/>
-              <a:t>https://infogram.com/uso-de-internet-segun-el-nivel-de-estudios-1hxr4zx9x35ro6y?live</a:t>
-            </a:r>
-          </a:p>
-        </p:txBody>
-      </p:sp>
-      <p:pic>
-        <p:nvPicPr>
-          <p:cNvPr id="5" name="Imagen 4">
+              <a:t>Análisis de los elementos visuales usados</a:t>
+            </a:r>
+          </a:p>
+        </p:txBody>
+      </p:sp>
+      <p:sp>
+        <p:nvSpPr>
+          <p:cNvPr id="3" name="Marcador de contenido 2">
             <a:extLst>
               <a:ext uri="{FF2B5EF4-FFF2-40B4-BE49-F238E27FC236}">
-                <a16:creationId xmlns:a16="http://schemas.microsoft.com/office/drawing/2014/main" id="{6626EBB9-1967-4F29-8EA0-36433C4AA9B4}"/>
+                <a16:creationId xmlns:a16="http://schemas.microsoft.com/office/drawing/2014/main" id="{F4FEBC87-7540-4E25-B5FF-427C3834B849}"/>
               </a:ext>
             </a:extLst>
           </p:cNvPr>
-          <p:cNvPicPr>
-            <a:picLocks noChangeAspect="1"/>
-          </p:cNvPicPr>
-          <p:nvPr/>
-        </p:nvPicPr>
-        <p:blipFill>
-          <a:blip r:embed="rId2"/>
-          <a:stretch>
-            <a:fillRect/>
-          </a:stretch>
-        </p:blipFill>
-        <p:spPr>
-          <a:xfrm>
-            <a:off x="3371533" y="1733385"/>
-            <a:ext cx="5448933" cy="4875672"/>
-          </a:xfrm>
-          <a:prstGeom prst="rect">
-            <a:avLst/>
-          </a:prstGeom>
-        </p:spPr>
-      </p:pic>
+          <p:cNvSpPr>
+            <a:spLocks noGrp="1"/>
+          </p:cNvSpPr>
+          <p:nvPr>
+            <p:ph idx="1"/>
+          </p:nvPr>
+        </p:nvSpPr>
+        <p:spPr/>
+        <p:txBody>
+          <a:bodyPr/>
+          <a:lstStyle/>
+          <a:p>
+            <a:r>
+              <a:rPr lang="es-ES" b="1" dirty="0"/>
+              <a:t>Gráficos</a:t>
+            </a:r>
+          </a:p>
+          <a:p>
+            <a:pPr lvl="1"/>
+            <a:r>
+              <a:rPr lang="es-ES" dirty="0"/>
+              <a:t>Gráfico de comparación de tamaños. (Factor sexo y estado amoroso).</a:t>
+            </a:r>
+          </a:p>
+          <a:p>
+            <a:pPr lvl="1"/>
+            <a:r>
+              <a:rPr lang="es-ES" dirty="0"/>
+              <a:t>Gráfico circular de anillo. (Factor nivel educativo de la madre y del padre).</a:t>
+            </a:r>
+          </a:p>
+          <a:p>
+            <a:pPr lvl="1"/>
+            <a:r>
+              <a:rPr lang="es-ES" dirty="0"/>
+              <a:t>Gráfico de barra </a:t>
+            </a:r>
+            <a:r>
+              <a:rPr lang="es-ES" dirty="0" err="1"/>
+              <a:t>pictorial</a:t>
+            </a:r>
+            <a:r>
+              <a:rPr lang="es-ES" dirty="0"/>
+              <a:t>. (Factor calidad de la relación familiar).</a:t>
+            </a:r>
+          </a:p>
+        </p:txBody>
+      </p:sp>
     </p:spTree>
     <p:extLst>
       <p:ext uri="{BB962C8B-B14F-4D97-AF65-F5344CB8AC3E}">
-        <p14:creationId xmlns:p14="http://schemas.microsoft.com/office/powerpoint/2010/main" val="411559146"/>
+        <p14:creationId xmlns:p14="http://schemas.microsoft.com/office/powerpoint/2010/main" val="3524167697"/>
       </p:ext>
     </p:extLst>
   </p:cSld>
@@ -4048,7 +4063,7 @@
           <p:cNvPr id="2" name="Título 1">
             <a:extLst>
               <a:ext uri="{FF2B5EF4-FFF2-40B4-BE49-F238E27FC236}">
-                <a16:creationId xmlns:a16="http://schemas.microsoft.com/office/drawing/2014/main" id="{BC8274FF-01F0-4D29-8A42-39D7DF238A2B}"/>
+                <a16:creationId xmlns:a16="http://schemas.microsoft.com/office/drawing/2014/main" id="{5E6A303E-5EBE-4DDA-B957-F88A271C06EC}"/>
               </a:ext>
             </a:extLst>
           </p:cNvPr>
@@ -4059,19 +4074,14 @@
             <p:ph type="title"/>
           </p:nvPr>
         </p:nvSpPr>
-        <p:spPr>
-          <a:xfrm>
-            <a:off x="1371600" y="685800"/>
-            <a:ext cx="9601200" cy="697727"/>
-          </a:xfrm>
-        </p:spPr>
+        <p:spPr/>
         <p:txBody>
           <a:bodyPr/>
           <a:lstStyle/>
           <a:p>
             <a:r>
               <a:rPr lang="es-ES" dirty="0"/>
-              <a:t>Definición de la técnica de visualización</a:t>
+              <a:t>Análisis de los elementos visuales usados</a:t>
             </a:r>
           </a:p>
         </p:txBody>
@@ -4081,7 +4091,7 @@
           <p:cNvPr id="3" name="Marcador de contenido 2">
             <a:extLst>
               <a:ext uri="{FF2B5EF4-FFF2-40B4-BE49-F238E27FC236}">
-                <a16:creationId xmlns:a16="http://schemas.microsoft.com/office/drawing/2014/main" id="{F3C72A16-4A4F-4A07-A19C-D109685ACF87}"/>
+                <a16:creationId xmlns:a16="http://schemas.microsoft.com/office/drawing/2014/main" id="{F4FEBC87-7540-4E25-B5FF-427C3834B849}"/>
               </a:ext>
             </a:extLst>
           </p:cNvPr>
@@ -4092,318 +4102,30 @@
             <p:ph idx="1"/>
           </p:nvPr>
         </p:nvSpPr>
-        <p:spPr>
-          <a:xfrm>
-            <a:off x="1371600" y="1383528"/>
-            <a:ext cx="9601200" cy="842838"/>
-          </a:xfrm>
-        </p:spPr>
+        <p:spPr/>
         <p:txBody>
           <a:bodyPr/>
           <a:lstStyle/>
           <a:p>
             <a:r>
               <a:rPr lang="es-ES" b="1" dirty="0"/>
-              <a:t>Nombre</a:t>
-            </a:r>
-            <a:r>
-              <a:rPr lang="es-ES" dirty="0"/>
-              <a:t>: gráfico de isotipo.</a:t>
-            </a:r>
-          </a:p>
-          <a:p>
-            <a:r>
-              <a:rPr lang="es-ES" b="1" dirty="0"/>
-              <a:t>Origen</a:t>
-            </a:r>
-            <a:r>
-              <a:rPr lang="es-ES" dirty="0"/>
-              <a:t>: en la década de 1930 – Marie y Otto Neurath (marido y mujer):</a:t>
-            </a:r>
-          </a:p>
-        </p:txBody>
-      </p:sp>
-      <p:sp>
-        <p:nvSpPr>
-          <p:cNvPr id="6" name="Marcador de contenido 2">
+              <a:t>Gráfico de comparación de tamaños (Factor sexo y estado amoroso):</a:t>
+            </a:r>
+          </a:p>
+          <a:p>
+            <a:pPr marL="0" indent="0">
+              <a:buNone/>
+            </a:pPr>
+            <a:endParaRPr lang="es-ES" b="1" dirty="0"/>
+          </a:p>
+        </p:txBody>
+      </p:sp>
+      <p:pic>
+        <p:nvPicPr>
+          <p:cNvPr id="4" name="Marcador de contenido 8">
             <a:extLst>
               <a:ext uri="{FF2B5EF4-FFF2-40B4-BE49-F238E27FC236}">
-                <a16:creationId xmlns:a16="http://schemas.microsoft.com/office/drawing/2014/main" id="{EF63C03E-4934-4385-B954-C602BBC1E148}"/>
-              </a:ext>
-            </a:extLst>
-          </p:cNvPr>
-          <p:cNvSpPr txBox="1">
-            <a:spLocks/>
-          </p:cNvSpPr>
-          <p:nvPr/>
-        </p:nvSpPr>
-        <p:spPr>
-          <a:xfrm>
-            <a:off x="1371600" y="5750781"/>
-            <a:ext cx="9601200" cy="842838"/>
-          </a:xfrm>
-          <a:prstGeom prst="rect">
-            <a:avLst/>
-          </a:prstGeom>
-        </p:spPr>
-        <p:txBody>
-          <a:bodyPr vert="horz" lIns="91440" tIns="45720" rIns="91440" bIns="45720" rtlCol="0">
-            <a:normAutofit/>
-          </a:bodyPr>
-          <a:lstStyle>
-            <a:lvl1pPr marL="384048" indent="-384048" algn="l" defTabSz="914400" rtl="0" eaLnBrk="1" latinLnBrk="0" hangingPunct="1">
-              <a:lnSpc>
-                <a:spcPct val="94000"/>
-              </a:lnSpc>
-              <a:spcBef>
-                <a:spcPts val="1000"/>
-              </a:spcBef>
-              <a:spcAft>
-                <a:spcPts val="200"/>
-              </a:spcAft>
-              <a:buFont typeface="Franklin Gothic Book" panose="020B0503020102020204" pitchFamily="34" charset="0"/>
-              <a:buChar char="■"/>
-              <a:defRPr sz="2000" kern="1200" baseline="0">
-                <a:solidFill>
-                  <a:schemeClr val="tx2"/>
-                </a:solidFill>
-                <a:latin typeface="+mn-lt"/>
-                <a:ea typeface="+mn-ea"/>
-                <a:cs typeface="+mn-cs"/>
-              </a:defRPr>
-            </a:lvl1pPr>
-            <a:lvl2pPr marL="914400" indent="-384048" algn="l" defTabSz="914400" rtl="0" eaLnBrk="1" latinLnBrk="0" hangingPunct="1">
-              <a:lnSpc>
-                <a:spcPct val="94000"/>
-              </a:lnSpc>
-              <a:spcBef>
-                <a:spcPts val="500"/>
-              </a:spcBef>
-              <a:spcAft>
-                <a:spcPts val="200"/>
-              </a:spcAft>
-              <a:buFont typeface="Franklin Gothic Book" panose="020B0503020102020204" pitchFamily="34" charset="0"/>
-              <a:buChar char="–"/>
-              <a:defRPr sz="2000" i="1" kern="1200" baseline="0">
-                <a:solidFill>
-                  <a:schemeClr val="tx2"/>
-                </a:solidFill>
-                <a:latin typeface="+mn-lt"/>
-                <a:ea typeface="+mn-ea"/>
-                <a:cs typeface="+mn-cs"/>
-              </a:defRPr>
-            </a:lvl2pPr>
-            <a:lvl3pPr marL="1371600" indent="-384048" algn="l" defTabSz="914400" rtl="0" eaLnBrk="1" latinLnBrk="0" hangingPunct="1">
-              <a:lnSpc>
-                <a:spcPct val="94000"/>
-              </a:lnSpc>
-              <a:spcBef>
-                <a:spcPts val="500"/>
-              </a:spcBef>
-              <a:spcAft>
-                <a:spcPts val="200"/>
-              </a:spcAft>
-              <a:buFont typeface="Franklin Gothic Book" panose="020B0503020102020204" pitchFamily="34" charset="0"/>
-              <a:buChar char="■"/>
-              <a:defRPr sz="1800" kern="1200" baseline="0">
-                <a:solidFill>
-                  <a:schemeClr val="tx2"/>
-                </a:solidFill>
-                <a:latin typeface="+mn-lt"/>
-                <a:ea typeface="+mn-ea"/>
-                <a:cs typeface="+mn-cs"/>
-              </a:defRPr>
-            </a:lvl3pPr>
-            <a:lvl4pPr marL="1828800" indent="-384048" algn="l" defTabSz="914400" rtl="0" eaLnBrk="1" latinLnBrk="0" hangingPunct="1">
-              <a:lnSpc>
-                <a:spcPct val="94000"/>
-              </a:lnSpc>
-              <a:spcBef>
-                <a:spcPts val="500"/>
-              </a:spcBef>
-              <a:spcAft>
-                <a:spcPts val="200"/>
-              </a:spcAft>
-              <a:buFont typeface="Franklin Gothic Book" panose="020B0503020102020204" pitchFamily="34" charset="0"/>
-              <a:buChar char="–"/>
-              <a:defRPr sz="1800" i="1" kern="1200" baseline="0">
-                <a:solidFill>
-                  <a:schemeClr val="tx2"/>
-                </a:solidFill>
-                <a:latin typeface="+mn-lt"/>
-                <a:ea typeface="+mn-ea"/>
-                <a:cs typeface="+mn-cs"/>
-              </a:defRPr>
-            </a:lvl4pPr>
-            <a:lvl5pPr marL="2286000" indent="-384048" algn="l" defTabSz="914400" rtl="0" eaLnBrk="1" latinLnBrk="0" hangingPunct="1">
-              <a:lnSpc>
-                <a:spcPct val="94000"/>
-              </a:lnSpc>
-              <a:spcBef>
-                <a:spcPts val="500"/>
-              </a:spcBef>
-              <a:spcAft>
-                <a:spcPts val="200"/>
-              </a:spcAft>
-              <a:buFont typeface="Franklin Gothic Book" panose="020B0503020102020204" pitchFamily="34" charset="0"/>
-              <a:buChar char="■"/>
-              <a:defRPr sz="1600" kern="1200" baseline="0">
-                <a:solidFill>
-                  <a:schemeClr val="tx2"/>
-                </a:solidFill>
-                <a:latin typeface="+mn-lt"/>
-                <a:ea typeface="+mn-ea"/>
-                <a:cs typeface="+mn-cs"/>
-              </a:defRPr>
-            </a:lvl5pPr>
-            <a:lvl6pPr marL="2743200" indent="-384048" algn="l" defTabSz="914400" rtl="0" eaLnBrk="1" latinLnBrk="0" hangingPunct="1">
-              <a:lnSpc>
-                <a:spcPct val="94000"/>
-              </a:lnSpc>
-              <a:spcBef>
-                <a:spcPts val="500"/>
-              </a:spcBef>
-              <a:spcAft>
-                <a:spcPts val="200"/>
-              </a:spcAft>
-              <a:buFont typeface="Franklin Gothic Book" panose="020B0503020102020204" pitchFamily="34" charset="0"/>
-              <a:buChar char="–"/>
-              <a:defRPr sz="1600" i="1" kern="1200" baseline="0">
-                <a:solidFill>
-                  <a:schemeClr val="tx2"/>
-                </a:solidFill>
-                <a:latin typeface="+mn-lt"/>
-                <a:ea typeface="+mn-ea"/>
-                <a:cs typeface="+mn-cs"/>
-              </a:defRPr>
-            </a:lvl6pPr>
-            <a:lvl7pPr marL="3200400" indent="-384048" algn="l" defTabSz="914400" rtl="0" eaLnBrk="1" latinLnBrk="0" hangingPunct="1">
-              <a:lnSpc>
-                <a:spcPct val="94000"/>
-              </a:lnSpc>
-              <a:spcBef>
-                <a:spcPts val="500"/>
-              </a:spcBef>
-              <a:spcAft>
-                <a:spcPts val="200"/>
-              </a:spcAft>
-              <a:buFont typeface="Franklin Gothic Book" panose="020B0503020102020204" pitchFamily="34" charset="0"/>
-              <a:buChar char="■"/>
-              <a:defRPr sz="1400" kern="1200" baseline="0">
-                <a:solidFill>
-                  <a:schemeClr val="tx2"/>
-                </a:solidFill>
-                <a:latin typeface="+mn-lt"/>
-                <a:ea typeface="+mn-ea"/>
-                <a:cs typeface="+mn-cs"/>
-              </a:defRPr>
-            </a:lvl7pPr>
-            <a:lvl8pPr marL="3657600" indent="-384048" algn="l" defTabSz="914400" rtl="0" eaLnBrk="1" latinLnBrk="0" hangingPunct="1">
-              <a:lnSpc>
-                <a:spcPct val="94000"/>
-              </a:lnSpc>
-              <a:spcBef>
-                <a:spcPts val="500"/>
-              </a:spcBef>
-              <a:spcAft>
-                <a:spcPts val="200"/>
-              </a:spcAft>
-              <a:buFont typeface="Franklin Gothic Book" panose="020B0503020102020204" pitchFamily="34" charset="0"/>
-              <a:buChar char="–"/>
-              <a:defRPr sz="1400" i="1" kern="1200" baseline="0">
-                <a:solidFill>
-                  <a:schemeClr val="tx2"/>
-                </a:solidFill>
-                <a:latin typeface="+mn-lt"/>
-                <a:ea typeface="+mn-ea"/>
-                <a:cs typeface="+mn-cs"/>
-              </a:defRPr>
-            </a:lvl8pPr>
-            <a:lvl9pPr marL="4114800" indent="-384048" algn="l" defTabSz="914400" rtl="0" eaLnBrk="1" latinLnBrk="0" hangingPunct="1">
-              <a:lnSpc>
-                <a:spcPct val="94000"/>
-              </a:lnSpc>
-              <a:spcBef>
-                <a:spcPts val="500"/>
-              </a:spcBef>
-              <a:spcAft>
-                <a:spcPts val="200"/>
-              </a:spcAft>
-              <a:buFont typeface="Franklin Gothic Book" panose="020B0503020102020204" pitchFamily="34" charset="0"/>
-              <a:buChar char="■"/>
-              <a:defRPr sz="1400" kern="1200" baseline="0">
-                <a:solidFill>
-                  <a:schemeClr val="tx2"/>
-                </a:solidFill>
-                <a:latin typeface="+mn-lt"/>
-                <a:ea typeface="+mn-ea"/>
-                <a:cs typeface="+mn-cs"/>
-              </a:defRPr>
-            </a:lvl9pPr>
-          </a:lstStyle>
-          <a:p>
-            <a:r>
-              <a:rPr lang="es-ES" b="1" dirty="0"/>
-              <a:t>Descripción</a:t>
-            </a:r>
-            <a:r>
-              <a:rPr lang="es-ES" dirty="0"/>
-              <a:t>: representa valores cuantitativos de una forma visual.</a:t>
-            </a:r>
-          </a:p>
-          <a:p>
-            <a:r>
-              <a:rPr lang="es-ES" b="1" dirty="0"/>
-              <a:t>Ejemplos</a:t>
-            </a:r>
-            <a:r>
-              <a:rPr lang="es-ES" dirty="0"/>
-              <a:t>: análisis de la población mundial, de los animales…</a:t>
-            </a:r>
-          </a:p>
-        </p:txBody>
-      </p:sp>
-      <p:sp>
-        <p:nvSpPr>
-          <p:cNvPr id="8" name="CuadroTexto 7">
-            <a:extLst>
-              <a:ext uri="{FF2B5EF4-FFF2-40B4-BE49-F238E27FC236}">
-                <a16:creationId xmlns:a16="http://schemas.microsoft.com/office/drawing/2014/main" id="{78BB0037-1F03-4513-8E69-8B472A928FBE}"/>
-              </a:ext>
-            </a:extLst>
-          </p:cNvPr>
-          <p:cNvSpPr txBox="1"/>
-          <p:nvPr/>
-        </p:nvSpPr>
-        <p:spPr>
-          <a:xfrm>
-            <a:off x="3549448" y="5388318"/>
-            <a:ext cx="4834393" cy="251817"/>
-          </a:xfrm>
-          <a:prstGeom prst="rect">
-            <a:avLst/>
-          </a:prstGeom>
-          <a:noFill/>
-        </p:spPr>
-        <p:txBody>
-          <a:bodyPr wrap="square">
-            <a:spAutoFit/>
-          </a:bodyPr>
-          <a:lstStyle/>
-          <a:p>
-            <a:r>
-              <a:rPr lang="es-ES" sz="1200" i="1" dirty="0"/>
-              <a:t>https://www.themarginalian.org/2011/03/08/the-transformer-isotype/</a:t>
-            </a:r>
-          </a:p>
-        </p:txBody>
-      </p:sp>
-      <p:pic>
-        <p:nvPicPr>
-          <p:cNvPr id="5" name="Imagen 4">
-            <a:extLst>
-              <a:ext uri="{FF2B5EF4-FFF2-40B4-BE49-F238E27FC236}">
-                <a16:creationId xmlns:a16="http://schemas.microsoft.com/office/drawing/2014/main" id="{BE50950E-0C10-47CB-A3A6-837EE94FB2D7}"/>
+                <a16:creationId xmlns:a16="http://schemas.microsoft.com/office/drawing/2014/main" id="{EF108957-B38D-43E8-8F3B-B3A8F163B617}"/>
               </a:ext>
             </a:extLst>
           </p:cNvPr>
@@ -4420,8 +4142,8 @@
         </p:blipFill>
         <p:spPr>
           <a:xfrm>
-            <a:off x="3621006" y="2311125"/>
-            <a:ext cx="4704009" cy="3098546"/>
+            <a:off x="3281755" y="2976955"/>
+            <a:ext cx="5780889" cy="2890445"/>
           </a:xfrm>
           <a:prstGeom prst="rect">
             <a:avLst/>
@@ -4431,7 +4153,7 @@
     </p:spTree>
     <p:extLst>
       <p:ext uri="{BB962C8B-B14F-4D97-AF65-F5344CB8AC3E}">
-        <p14:creationId xmlns:p14="http://schemas.microsoft.com/office/powerpoint/2010/main" val="1152210597"/>
+        <p14:creationId xmlns:p14="http://schemas.microsoft.com/office/powerpoint/2010/main" val="900875350"/>
       </p:ext>
     </p:extLst>
   </p:cSld>
@@ -4463,7 +4185,7 @@
           <p:cNvPr id="2" name="Título 1">
             <a:extLst>
               <a:ext uri="{FF2B5EF4-FFF2-40B4-BE49-F238E27FC236}">
-                <a16:creationId xmlns:a16="http://schemas.microsoft.com/office/drawing/2014/main" id="{BC8274FF-01F0-4D29-8A42-39D7DF238A2B}"/>
+                <a16:creationId xmlns:a16="http://schemas.microsoft.com/office/drawing/2014/main" id="{5E6A303E-5EBE-4DDA-B957-F88A271C06EC}"/>
               </a:ext>
             </a:extLst>
           </p:cNvPr>
@@ -4474,19 +4196,14 @@
             <p:ph type="title"/>
           </p:nvPr>
         </p:nvSpPr>
-        <p:spPr>
-          <a:xfrm>
-            <a:off x="1371600" y="685800"/>
-            <a:ext cx="9601200" cy="697727"/>
-          </a:xfrm>
-        </p:spPr>
+        <p:spPr/>
         <p:txBody>
           <a:bodyPr/>
           <a:lstStyle/>
           <a:p>
             <a:r>
               <a:rPr lang="es-ES" dirty="0"/>
-              <a:t>Definición de la técnica de visualización</a:t>
+              <a:t>Análisis de los elementos visuales usados</a:t>
             </a:r>
           </a:p>
         </p:txBody>
@@ -4496,7 +4213,7 @@
           <p:cNvPr id="3" name="Marcador de contenido 2">
             <a:extLst>
               <a:ext uri="{FF2B5EF4-FFF2-40B4-BE49-F238E27FC236}">
-                <a16:creationId xmlns:a16="http://schemas.microsoft.com/office/drawing/2014/main" id="{F3C72A16-4A4F-4A07-A19C-D109685ACF87}"/>
+                <a16:creationId xmlns:a16="http://schemas.microsoft.com/office/drawing/2014/main" id="{F4FEBC87-7540-4E25-B5FF-427C3834B849}"/>
               </a:ext>
             </a:extLst>
           </p:cNvPr>
@@ -4507,52 +4224,58 @@
             <p:ph idx="1"/>
           </p:nvPr>
         </p:nvSpPr>
-        <p:spPr>
-          <a:xfrm>
-            <a:off x="1371600" y="1582310"/>
-            <a:ext cx="9601200" cy="3339547"/>
-          </a:xfrm>
-        </p:spPr>
+        <p:spPr/>
         <p:txBody>
           <a:bodyPr/>
           <a:lstStyle/>
           <a:p>
             <a:r>
               <a:rPr lang="es-ES" b="1" dirty="0"/>
-              <a:t>Tipo de datos que representa</a:t>
-            </a:r>
-            <a:r>
-              <a:rPr lang="es-ES" dirty="0"/>
-              <a:t>: datos cuantitativos, donde cada pictograma representa un valor.</a:t>
-            </a:r>
-          </a:p>
-          <a:p>
-            <a:r>
-              <a:rPr lang="es-ES" b="1" dirty="0"/>
-              <a:t>Estructura de los datos</a:t>
-            </a:r>
-            <a:r>
-              <a:rPr lang="es-ES" dirty="0"/>
-              <a:t>: a nivel atómico un pictograma solo puede representar un valor.</a:t>
-            </a:r>
-          </a:p>
-          <a:p>
-            <a:r>
-              <a:rPr lang="es-ES" b="1" dirty="0"/>
-              <a:t>Limitación del juego de datos</a:t>
-            </a:r>
-            <a:r>
-              <a:rPr lang="es-ES" dirty="0"/>
-              <a:t>: sí que hay limitación, el juego de datos tiene que estar acotado (mínimo, máximo).</a:t>
-            </a:r>
+              <a:t>Gráfico circular de anillo (Factor nivel educativo):</a:t>
+            </a:r>
+          </a:p>
+          <a:p>
+            <a:pPr marL="0" indent="0">
+              <a:buNone/>
+            </a:pPr>
             <a:endParaRPr lang="es-ES" b="1" dirty="0"/>
           </a:p>
         </p:txBody>
       </p:sp>
+      <p:pic>
+        <p:nvPicPr>
+          <p:cNvPr id="5" name="Marcador de contenido 6">
+            <a:extLst>
+              <a:ext uri="{FF2B5EF4-FFF2-40B4-BE49-F238E27FC236}">
+                <a16:creationId xmlns:a16="http://schemas.microsoft.com/office/drawing/2014/main" id="{9B5E29A5-D260-4419-A230-219AE21AC623}"/>
+              </a:ext>
+            </a:extLst>
+          </p:cNvPr>
+          <p:cNvPicPr>
+            <a:picLocks noChangeAspect="1"/>
+          </p:cNvPicPr>
+          <p:nvPr/>
+        </p:nvPicPr>
+        <p:blipFill>
+          <a:blip r:embed="rId2"/>
+          <a:stretch>
+            <a:fillRect/>
+          </a:stretch>
+        </p:blipFill>
+        <p:spPr>
+          <a:xfrm>
+            <a:off x="3784425" y="2893950"/>
+            <a:ext cx="4623149" cy="3584701"/>
+          </a:xfrm>
+          <a:prstGeom prst="rect">
+            <a:avLst/>
+          </a:prstGeom>
+        </p:spPr>
+      </p:pic>
     </p:spTree>
     <p:extLst>
       <p:ext uri="{BB962C8B-B14F-4D97-AF65-F5344CB8AC3E}">
-        <p14:creationId xmlns:p14="http://schemas.microsoft.com/office/powerpoint/2010/main" val="3931350364"/>
+        <p14:creationId xmlns:p14="http://schemas.microsoft.com/office/powerpoint/2010/main" val="947323000"/>
       </p:ext>
     </p:extLst>
   </p:cSld>
@@ -4584,7 +4307,7 @@
           <p:cNvPr id="2" name="Título 1">
             <a:extLst>
               <a:ext uri="{FF2B5EF4-FFF2-40B4-BE49-F238E27FC236}">
-                <a16:creationId xmlns:a16="http://schemas.microsoft.com/office/drawing/2014/main" id="{C975D6E1-9488-4C0E-A451-4F7F4DBA007B}"/>
+                <a16:creationId xmlns:a16="http://schemas.microsoft.com/office/drawing/2014/main" id="{5E6A303E-5EBE-4DDA-B957-F88A271C06EC}"/>
               </a:ext>
             </a:extLst>
           </p:cNvPr>
@@ -4595,29 +4318,66 @@
             <p:ph type="title"/>
           </p:nvPr>
         </p:nvSpPr>
-        <p:spPr>
-          <a:xfrm>
-            <a:off x="1371600" y="685800"/>
-            <a:ext cx="9601200" cy="721581"/>
-          </a:xfrm>
-        </p:spPr>
+        <p:spPr/>
         <p:txBody>
           <a:bodyPr/>
           <a:lstStyle/>
           <a:p>
             <a:r>
               <a:rPr lang="es-ES" dirty="0"/>
-              <a:t>Representación del gráfico de isotipo</a:t>
-            </a:r>
+              <a:t>Análisis de los elementos visuales usados</a:t>
+            </a:r>
+          </a:p>
+        </p:txBody>
+      </p:sp>
+      <p:sp>
+        <p:nvSpPr>
+          <p:cNvPr id="3" name="Marcador de contenido 2">
+            <a:extLst>
+              <a:ext uri="{FF2B5EF4-FFF2-40B4-BE49-F238E27FC236}">
+                <a16:creationId xmlns:a16="http://schemas.microsoft.com/office/drawing/2014/main" id="{F4FEBC87-7540-4E25-B5FF-427C3834B849}"/>
+              </a:ext>
+            </a:extLst>
+          </p:cNvPr>
+          <p:cNvSpPr>
+            <a:spLocks noGrp="1"/>
+          </p:cNvSpPr>
+          <p:nvPr>
+            <p:ph idx="1"/>
+          </p:nvPr>
+        </p:nvSpPr>
+        <p:spPr/>
+        <p:txBody>
+          <a:bodyPr/>
+          <a:lstStyle/>
+          <a:p>
+            <a:r>
+              <a:rPr lang="es-ES" b="1" dirty="0"/>
+              <a:t>Gráfico de barra </a:t>
+            </a:r>
+            <a:r>
+              <a:rPr lang="es-ES" b="1" dirty="0" err="1"/>
+              <a:t>pictorial</a:t>
+            </a:r>
+            <a:r>
+              <a:rPr lang="es-ES" b="1" dirty="0"/>
+              <a:t> (Factor calidad de la relación familiar):</a:t>
+            </a:r>
+          </a:p>
+          <a:p>
+            <a:pPr marL="0" indent="0">
+              <a:buNone/>
+            </a:pPr>
+            <a:endParaRPr lang="es-ES" b="1" dirty="0"/>
           </a:p>
         </p:txBody>
       </p:sp>
       <p:pic>
         <p:nvPicPr>
-          <p:cNvPr id="4" name="Imagen 3">
+          <p:cNvPr id="6" name="Marcador de contenido 8">
             <a:extLst>
               <a:ext uri="{FF2B5EF4-FFF2-40B4-BE49-F238E27FC236}">
-                <a16:creationId xmlns:a16="http://schemas.microsoft.com/office/drawing/2014/main" id="{D6112895-188F-4E99-B754-27833DEA162C}"/>
+                <a16:creationId xmlns:a16="http://schemas.microsoft.com/office/drawing/2014/main" id="{833B8ED8-E5DF-43CC-82C4-4A4713AE0F07}"/>
               </a:ext>
             </a:extLst>
           </p:cNvPr>
@@ -4634,8 +4394,8 @@
         </p:blipFill>
         <p:spPr>
           <a:xfrm>
-            <a:off x="3114351" y="1407381"/>
-            <a:ext cx="5963298" cy="5335923"/>
+            <a:off x="3575843" y="2927616"/>
+            <a:ext cx="5192713" cy="3239613"/>
           </a:xfrm>
           <a:prstGeom prst="rect">
             <a:avLst/>
@@ -4645,7 +4405,7 @@
     </p:spTree>
     <p:extLst>
       <p:ext uri="{BB962C8B-B14F-4D97-AF65-F5344CB8AC3E}">
-        <p14:creationId xmlns:p14="http://schemas.microsoft.com/office/powerpoint/2010/main" val="168019351"/>
+        <p14:creationId xmlns:p14="http://schemas.microsoft.com/office/powerpoint/2010/main" val="4172245977"/>
       </p:ext>
     </p:extLst>
   </p:cSld>
@@ -4656,6 +4416,310 @@
 </file>
 
 <file path=ppt/slides/slide14.xml><?xml version="1.0" encoding="utf-8"?>
+<p:sld xmlns:a="http://schemas.openxmlformats.org/drawingml/2006/main" xmlns:r="http://schemas.openxmlformats.org/officeDocument/2006/relationships" xmlns:p="http://schemas.openxmlformats.org/presentationml/2006/main">
+  <p:cSld>
+    <p:spTree>
+      <p:nvGrpSpPr>
+        <p:cNvPr id="1" name=""/>
+        <p:cNvGrpSpPr/>
+        <p:nvPr/>
+      </p:nvGrpSpPr>
+      <p:grpSpPr>
+        <a:xfrm>
+          <a:off x="0" y="0"/>
+          <a:ext cx="0" cy="0"/>
+          <a:chOff x="0" y="0"/>
+          <a:chExt cx="0" cy="0"/>
+        </a:xfrm>
+      </p:grpSpPr>
+      <p:sp>
+        <p:nvSpPr>
+          <p:cNvPr id="2" name="Título 1">
+            <a:extLst>
+              <a:ext uri="{FF2B5EF4-FFF2-40B4-BE49-F238E27FC236}">
+                <a16:creationId xmlns:a16="http://schemas.microsoft.com/office/drawing/2014/main" id="{F1E55AB6-BF8B-4038-A641-E4F6989D4A04}"/>
+              </a:ext>
+            </a:extLst>
+          </p:cNvPr>
+          <p:cNvSpPr>
+            <a:spLocks noGrp="1"/>
+          </p:cNvSpPr>
+          <p:nvPr>
+            <p:ph type="title"/>
+          </p:nvPr>
+        </p:nvSpPr>
+        <p:spPr/>
+        <p:txBody>
+          <a:bodyPr/>
+          <a:lstStyle/>
+          <a:p>
+            <a:r>
+              <a:rPr lang="es-ES" dirty="0"/>
+              <a:t>Análisis de los elementos visuales usados</a:t>
+            </a:r>
+          </a:p>
+        </p:txBody>
+      </p:sp>
+      <p:sp>
+        <p:nvSpPr>
+          <p:cNvPr id="3" name="Marcador de contenido 2">
+            <a:extLst>
+              <a:ext uri="{FF2B5EF4-FFF2-40B4-BE49-F238E27FC236}">
+                <a16:creationId xmlns:a16="http://schemas.microsoft.com/office/drawing/2014/main" id="{67343A6B-CA41-4D91-BCE0-4395952A3F78}"/>
+              </a:ext>
+            </a:extLst>
+          </p:cNvPr>
+          <p:cNvSpPr>
+            <a:spLocks noGrp="1"/>
+          </p:cNvSpPr>
+          <p:nvPr>
+            <p:ph idx="1"/>
+          </p:nvPr>
+        </p:nvSpPr>
+        <p:spPr/>
+        <p:txBody>
+          <a:bodyPr/>
+          <a:lstStyle/>
+          <a:p>
+            <a:r>
+              <a:rPr lang="es-ES" b="1" dirty="0"/>
+              <a:t>Interacción: </a:t>
+            </a:r>
+            <a:r>
+              <a:rPr lang="es-ES" dirty="0"/>
+              <a:t>todos los gráficos usados permiten la interacción, haciendo observable el porcentaje de estudiantes que tienen un alto consumo de alcohol según el factor a analizar.</a:t>
+            </a:r>
+          </a:p>
+          <a:p>
+            <a:r>
+              <a:rPr lang="es-ES" b="1" dirty="0"/>
+              <a:t>Colores: </a:t>
+            </a:r>
+            <a:r>
+              <a:rPr lang="es-ES" dirty="0"/>
+              <a:t>colores llamativos y elegantes.</a:t>
+            </a:r>
+            <a:endParaRPr lang="es-ES" b="1" dirty="0"/>
+          </a:p>
+          <a:p>
+            <a:r>
+              <a:rPr lang="es-ES" b="1" dirty="0"/>
+              <a:t>Textos: </a:t>
+            </a:r>
+            <a:r>
+              <a:rPr lang="es-ES" dirty="0"/>
+              <a:t>los mínimos posibles para mantener la estética sin perder información. Relación entre el texto y su color con el gráfico para facilitar la interpretación.</a:t>
+            </a:r>
+            <a:endParaRPr lang="es-ES" b="1" dirty="0"/>
+          </a:p>
+        </p:txBody>
+      </p:sp>
+      <p:pic>
+        <p:nvPicPr>
+          <p:cNvPr id="4" name="Marcador de contenido 8">
+            <a:extLst>
+              <a:ext uri="{FF2B5EF4-FFF2-40B4-BE49-F238E27FC236}">
+                <a16:creationId xmlns:a16="http://schemas.microsoft.com/office/drawing/2014/main" id="{E50CE7E7-A2DC-4C3A-B85F-096B65CA7554}"/>
+              </a:ext>
+            </a:extLst>
+          </p:cNvPr>
+          <p:cNvPicPr>
+            <a:picLocks noChangeAspect="1"/>
+          </p:cNvPicPr>
+          <p:nvPr/>
+        </p:nvPicPr>
+        <p:blipFill>
+          <a:blip r:embed="rId2"/>
+          <a:stretch>
+            <a:fillRect/>
+          </a:stretch>
+        </p:blipFill>
+        <p:spPr>
+          <a:xfrm>
+            <a:off x="4119696" y="4599022"/>
+            <a:ext cx="4105007" cy="2052504"/>
+          </a:xfrm>
+          <a:prstGeom prst="rect">
+            <a:avLst/>
+          </a:prstGeom>
+        </p:spPr>
+      </p:pic>
+    </p:spTree>
+    <p:extLst>
+      <p:ext uri="{BB962C8B-B14F-4D97-AF65-F5344CB8AC3E}">
+        <p14:creationId xmlns:p14="http://schemas.microsoft.com/office/powerpoint/2010/main" val="1609949949"/>
+      </p:ext>
+    </p:extLst>
+  </p:cSld>
+  <p:clrMapOvr>
+    <a:masterClrMapping/>
+  </p:clrMapOvr>
+</p:sld>
+</file>
+
+<file path=ppt/slides/slide15.xml><?xml version="1.0" encoding="utf-8"?>
+<p:sld xmlns:a="http://schemas.openxmlformats.org/drawingml/2006/main" xmlns:r="http://schemas.openxmlformats.org/officeDocument/2006/relationships" xmlns:p="http://schemas.openxmlformats.org/presentationml/2006/main">
+  <p:cSld>
+    <p:spTree>
+      <p:nvGrpSpPr>
+        <p:cNvPr id="1" name=""/>
+        <p:cNvGrpSpPr/>
+        <p:nvPr/>
+      </p:nvGrpSpPr>
+      <p:grpSpPr>
+        <a:xfrm>
+          <a:off x="0" y="0"/>
+          <a:ext cx="0" cy="0"/>
+          <a:chOff x="0" y="0"/>
+          <a:chExt cx="0" cy="0"/>
+        </a:xfrm>
+      </p:grpSpPr>
+      <p:sp>
+        <p:nvSpPr>
+          <p:cNvPr id="2" name="Título 1">
+            <a:extLst>
+              <a:ext uri="{FF2B5EF4-FFF2-40B4-BE49-F238E27FC236}">
+                <a16:creationId xmlns:a16="http://schemas.microsoft.com/office/drawing/2014/main" id="{1117A98A-E8E0-406C-8883-21B7F5869775}"/>
+              </a:ext>
+            </a:extLst>
+          </p:cNvPr>
+          <p:cNvSpPr>
+            <a:spLocks noGrp="1"/>
+          </p:cNvSpPr>
+          <p:nvPr>
+            <p:ph type="title"/>
+          </p:nvPr>
+        </p:nvSpPr>
+        <p:spPr>
+          <a:xfrm>
+            <a:off x="1371600" y="685800"/>
+            <a:ext cx="9601200" cy="761337"/>
+          </a:xfrm>
+        </p:spPr>
+        <p:txBody>
+          <a:bodyPr/>
+          <a:lstStyle/>
+          <a:p>
+            <a:r>
+              <a:rPr lang="es-ES" dirty="0"/>
+              <a:t>Reflexión final</a:t>
+            </a:r>
+          </a:p>
+        </p:txBody>
+      </p:sp>
+      <p:sp>
+        <p:nvSpPr>
+          <p:cNvPr id="3" name="Marcador de contenido 2">
+            <a:extLst>
+              <a:ext uri="{FF2B5EF4-FFF2-40B4-BE49-F238E27FC236}">
+                <a16:creationId xmlns:a16="http://schemas.microsoft.com/office/drawing/2014/main" id="{E7FB0E0C-0A5C-4387-9620-270402FD6BD6}"/>
+              </a:ext>
+            </a:extLst>
+          </p:cNvPr>
+          <p:cNvSpPr>
+            <a:spLocks noGrp="1"/>
+          </p:cNvSpPr>
+          <p:nvPr>
+            <p:ph idx="1"/>
+          </p:nvPr>
+        </p:nvSpPr>
+        <p:spPr>
+          <a:xfrm>
+            <a:off x="1371600" y="1447137"/>
+            <a:ext cx="9601200" cy="5255813"/>
+          </a:xfrm>
+        </p:spPr>
+        <p:txBody>
+          <a:bodyPr/>
+          <a:lstStyle/>
+          <a:p>
+            <a:r>
+              <a:rPr lang="es-ES" dirty="0"/>
+              <a:t>Dar respuesta a la pregunta “¿Conocemos las causas del consumo de alcohol en nuestros hijos?”</a:t>
+            </a:r>
+          </a:p>
+          <a:p>
+            <a:r>
+              <a:rPr lang="es-ES" dirty="0"/>
+              <a:t>A partir de microhistorias del consumo según diferentes factores (sexo, el nivel educativo, la calidad de la relación familiar y estado amoroso).</a:t>
+            </a:r>
+          </a:p>
+          <a:p>
+            <a:r>
+              <a:rPr lang="es-ES" dirty="0"/>
+              <a:t>Conocimiento obtenido es que el sexo, el nivel educativo de los padres y la relación familiar afectan al consumo de alcohol entre los estudiantes, no sucede los mismo con el estado amoroso.</a:t>
+            </a:r>
+          </a:p>
+          <a:p>
+            <a:r>
+              <a:rPr lang="es-ES" dirty="0"/>
+              <a:t>Para captar la atención del usuario final (padres):</a:t>
+            </a:r>
+          </a:p>
+          <a:p>
+            <a:pPr lvl="1"/>
+            <a:r>
+              <a:rPr lang="es-ES" dirty="0"/>
+              <a:t>Título llamativo (</a:t>
+            </a:r>
+            <a:r>
+              <a:rPr lang="es-ES" dirty="0" err="1"/>
+              <a:t>clickbait</a:t>
+            </a:r>
+            <a:r>
+              <a:rPr lang="es-ES" dirty="0"/>
+              <a:t>).</a:t>
+            </a:r>
+          </a:p>
+          <a:p>
+            <a:pPr lvl="1"/>
+            <a:r>
+              <a:rPr lang="es-ES" dirty="0"/>
+              <a:t>Gama de colores elegante.</a:t>
+            </a:r>
+          </a:p>
+          <a:p>
+            <a:pPr lvl="1"/>
+            <a:r>
+              <a:rPr lang="es-ES" dirty="0"/>
+              <a:t>Gráficos simples (fáciles de entender).</a:t>
+            </a:r>
+          </a:p>
+          <a:p>
+            <a:pPr lvl="1"/>
+            <a:r>
+              <a:rPr lang="es-ES" dirty="0"/>
+              <a:t>Textos a diferentes tamaños y colores.</a:t>
+            </a:r>
+          </a:p>
+          <a:p>
+            <a:pPr lvl="1"/>
+            <a:r>
+              <a:rPr lang="es-ES" dirty="0"/>
+              <a:t>Búsqueda de la estética sin </a:t>
+            </a:r>
+            <a:r>
+              <a:rPr lang="es-ES"/>
+              <a:t>perder información.</a:t>
+            </a:r>
+            <a:endParaRPr lang="es-ES" dirty="0"/>
+          </a:p>
+        </p:txBody>
+      </p:sp>
+    </p:spTree>
+    <p:extLst>
+      <p:ext uri="{BB962C8B-B14F-4D97-AF65-F5344CB8AC3E}">
+        <p14:creationId xmlns:p14="http://schemas.microsoft.com/office/powerpoint/2010/main" val="2111788142"/>
+      </p:ext>
+    </p:extLst>
+  </p:cSld>
+  <p:clrMapOvr>
+    <a:masterClrMapping/>
+  </p:clrMapOvr>
+</p:sld>
+</file>
+
+<file path=ppt/slides/slide16.xml><?xml version="1.0" encoding="utf-8"?>
 <p:sld xmlns:a="http://schemas.openxmlformats.org/drawingml/2006/main" xmlns:r="http://schemas.openxmlformats.org/officeDocument/2006/relationships" xmlns:p="http://schemas.openxmlformats.org/presentationml/2006/main">
   <p:cSld>
     <p:spTree>
@@ -4741,7 +4805,7 @@
           <p:cNvPr id="2" name="Título 1">
             <a:extLst>
               <a:ext uri="{FF2B5EF4-FFF2-40B4-BE49-F238E27FC236}">
-                <a16:creationId xmlns:a16="http://schemas.microsoft.com/office/drawing/2014/main" id="{DAA4DABF-1EB7-47D6-B449-C6454560C629}"/>
+                <a16:creationId xmlns:a16="http://schemas.microsoft.com/office/drawing/2014/main" id="{507EB7A1-2927-4C21-9F09-E951A832A312}"/>
               </a:ext>
             </a:extLst>
           </p:cNvPr>
@@ -4752,38 +4816,95 @@
             <p:ph type="title"/>
           </p:nvPr>
         </p:nvSpPr>
-        <p:spPr>
-          <a:xfrm>
-            <a:off x="1371600" y="685800"/>
-            <a:ext cx="9601200" cy="912412"/>
-          </a:xfrm>
-        </p:spPr>
-        <p:txBody>
-          <a:bodyPr>
-            <a:normAutofit/>
-          </a:bodyPr>
+        <p:spPr/>
+        <p:txBody>
+          <a:bodyPr/>
           <a:lstStyle/>
           <a:p>
             <a:r>
               <a:rPr lang="es-ES" dirty="0"/>
-              <a:t>Gráfico de barras</a:t>
-            </a:r>
-            <a:br>
+              <a:t>¿Conocemos las causas del consumo de alcohol en nuestros hijos?</a:t>
+            </a:r>
+          </a:p>
+        </p:txBody>
+      </p:sp>
+      <p:sp>
+        <p:nvSpPr>
+          <p:cNvPr id="3" name="Marcador de contenido 2">
+            <a:extLst>
+              <a:ext uri="{FF2B5EF4-FFF2-40B4-BE49-F238E27FC236}">
+                <a16:creationId xmlns:a16="http://schemas.microsoft.com/office/drawing/2014/main" id="{47FD3F72-E4AF-4EE6-AE8D-EE2771E60E54}"/>
+              </a:ext>
+            </a:extLst>
+          </p:cNvPr>
+          <p:cNvSpPr>
+            <a:spLocks noGrp="1"/>
+          </p:cNvSpPr>
+          <p:nvPr>
+            <p:ph idx="1"/>
+          </p:nvPr>
+        </p:nvSpPr>
+        <p:spPr>
+          <a:xfrm>
+            <a:off x="1371600" y="2286000"/>
+            <a:ext cx="6007210" cy="3581400"/>
+          </a:xfrm>
+        </p:spPr>
+        <p:txBody>
+          <a:bodyPr/>
+          <a:lstStyle/>
+          <a:p>
+            <a:r>
               <a:rPr lang="es-ES" dirty="0"/>
-            </a:br>
-            <a:r>
-              <a:rPr lang="es-ES" sz="1600" i="1" dirty="0"/>
-              <a:t>https://infogram.com/cuando-ser-madre-1ho16vo1l17kx4n?live</a:t>
-            </a:r>
+              <a:t>En este storytelling se va a dar una respuesta sobre qué factores sociales afectan al consumo de alcohol entre estudiantes adolescentes, entendiendo por factores sociales:</a:t>
+            </a:r>
+          </a:p>
+          <a:p>
+            <a:pPr lvl="1"/>
+            <a:r>
+              <a:rPr lang="es-ES" dirty="0"/>
+              <a:t>El género (sexo).</a:t>
+            </a:r>
+          </a:p>
+          <a:p>
+            <a:pPr lvl="1"/>
+            <a:r>
+              <a:rPr lang="es-ES" dirty="0"/>
+              <a:t>El nivel educativo de la madre.</a:t>
+            </a:r>
+          </a:p>
+          <a:p>
+            <a:pPr lvl="1"/>
+            <a:r>
+              <a:rPr lang="es-ES" dirty="0"/>
+              <a:t>El nivel educativo del padre.</a:t>
+            </a:r>
+          </a:p>
+          <a:p>
+            <a:pPr lvl="1"/>
+            <a:r>
+              <a:rPr lang="es-ES" dirty="0"/>
+              <a:t>La calidad de la relación familiar.</a:t>
+            </a:r>
+          </a:p>
+          <a:p>
+            <a:pPr lvl="1"/>
+            <a:r>
+              <a:rPr lang="es-ES" dirty="0"/>
+              <a:t>El estado amoroso.</a:t>
+            </a:r>
+          </a:p>
+          <a:p>
+            <a:endParaRPr lang="es-ES" dirty="0"/>
           </a:p>
         </p:txBody>
       </p:sp>
       <p:pic>
         <p:nvPicPr>
-          <p:cNvPr id="6" name="Imagen 5">
+          <p:cNvPr id="5" name="Imagen 4">
             <a:extLst>
               <a:ext uri="{FF2B5EF4-FFF2-40B4-BE49-F238E27FC236}">
-                <a16:creationId xmlns:a16="http://schemas.microsoft.com/office/drawing/2014/main" id="{498BB2ED-B521-4047-90BF-4A331B1AF146}"/>
+                <a16:creationId xmlns:a16="http://schemas.microsoft.com/office/drawing/2014/main" id="{A7DFCBAD-D7CB-4A2A-87D4-46497CDA5454}"/>
               </a:ext>
             </a:extLst>
           </p:cNvPr>
@@ -4800,18 +4921,83 @@
         </p:blipFill>
         <p:spPr>
           <a:xfrm>
-            <a:off x="3264010" y="1979875"/>
-            <a:ext cx="5663980" cy="4297669"/>
+            <a:off x="7578174" y="2286000"/>
+            <a:ext cx="1757878" cy="3092063"/>
           </a:xfrm>
           <a:prstGeom prst="rect">
             <a:avLst/>
           </a:prstGeom>
         </p:spPr>
       </p:pic>
+      <p:pic>
+        <p:nvPicPr>
+          <p:cNvPr id="7" name="Imagen 6">
+            <a:extLst>
+              <a:ext uri="{FF2B5EF4-FFF2-40B4-BE49-F238E27FC236}">
+                <a16:creationId xmlns:a16="http://schemas.microsoft.com/office/drawing/2014/main" id="{C514F2EE-A8EA-4855-93DF-D6101AB43BAE}"/>
+              </a:ext>
+            </a:extLst>
+          </p:cNvPr>
+          <p:cNvPicPr>
+            <a:picLocks noChangeAspect="1"/>
+          </p:cNvPicPr>
+          <p:nvPr/>
+        </p:nvPicPr>
+        <p:blipFill>
+          <a:blip r:embed="rId3"/>
+          <a:stretch>
+            <a:fillRect/>
+          </a:stretch>
+        </p:blipFill>
+        <p:spPr>
+          <a:xfrm>
+            <a:off x="9439419" y="2286000"/>
+            <a:ext cx="2343983" cy="3092063"/>
+          </a:xfrm>
+          <a:prstGeom prst="rect">
+            <a:avLst/>
+          </a:prstGeom>
+        </p:spPr>
+      </p:pic>
+      <p:sp>
+        <p:nvSpPr>
+          <p:cNvPr id="9" name="CuadroTexto 8">
+            <a:extLst>
+              <a:ext uri="{FF2B5EF4-FFF2-40B4-BE49-F238E27FC236}">
+                <a16:creationId xmlns:a16="http://schemas.microsoft.com/office/drawing/2014/main" id="{3218F668-DDB7-4580-9EB3-57D8FB4A17FA}"/>
+              </a:ext>
+            </a:extLst>
+          </p:cNvPr>
+          <p:cNvSpPr txBox="1"/>
+          <p:nvPr/>
+        </p:nvSpPr>
+        <p:spPr>
+          <a:xfrm>
+            <a:off x="7522516" y="5378063"/>
+            <a:ext cx="4205229" cy="461665"/>
+          </a:xfrm>
+          <a:prstGeom prst="rect">
+            <a:avLst/>
+          </a:prstGeom>
+          <a:noFill/>
+        </p:spPr>
+        <p:txBody>
+          <a:bodyPr wrap="square">
+            <a:spAutoFit/>
+          </a:bodyPr>
+          <a:lstStyle/>
+          <a:p>
+            <a:r>
+              <a:rPr lang="es-ES" sz="1200" i="1" dirty="0"/>
+              <a:t>https://infogram.com/conocemos-las-causas-del-consumo-de-alcohol-en-nuestros-hijos-1hdw2jpej8y5p2l?live</a:t>
+            </a:r>
+          </a:p>
+        </p:txBody>
+      </p:sp>
     </p:spTree>
     <p:extLst>
       <p:ext uri="{BB962C8B-B14F-4D97-AF65-F5344CB8AC3E}">
-        <p14:creationId xmlns:p14="http://schemas.microsoft.com/office/powerpoint/2010/main" val="2423682123"/>
+        <p14:creationId xmlns:p14="http://schemas.microsoft.com/office/powerpoint/2010/main" val="3456228747"/>
       </p:ext>
     </p:extLst>
   </p:cSld>
@@ -4843,7 +5029,7 @@
           <p:cNvPr id="2" name="Título 1">
             <a:extLst>
               <a:ext uri="{FF2B5EF4-FFF2-40B4-BE49-F238E27FC236}">
-                <a16:creationId xmlns:a16="http://schemas.microsoft.com/office/drawing/2014/main" id="{BC8274FF-01F0-4D29-8A42-39D7DF238A2B}"/>
+                <a16:creationId xmlns:a16="http://schemas.microsoft.com/office/drawing/2014/main" id="{1805C2E0-70CC-400B-8705-E9C4E018D821}"/>
               </a:ext>
             </a:extLst>
           </p:cNvPr>
@@ -4856,8 +5042,8 @@
         </p:nvSpPr>
         <p:spPr>
           <a:xfrm>
-            <a:off x="1371600" y="685800"/>
-            <a:ext cx="9601200" cy="697727"/>
+            <a:off x="1371600" y="685801"/>
+            <a:ext cx="9601200" cy="713630"/>
           </a:xfrm>
         </p:spPr>
         <p:txBody>
@@ -4866,7 +5052,7 @@
           <a:p>
             <a:r>
               <a:rPr lang="es-ES" dirty="0"/>
-              <a:t>Definición de la técnica de visualización</a:t>
+              <a:t>Fuente de datos</a:t>
             </a:r>
           </a:p>
         </p:txBody>
@@ -4876,7 +5062,7 @@
           <p:cNvPr id="3" name="Marcador de contenido 2">
             <a:extLst>
               <a:ext uri="{FF2B5EF4-FFF2-40B4-BE49-F238E27FC236}">
-                <a16:creationId xmlns:a16="http://schemas.microsoft.com/office/drawing/2014/main" id="{F3C72A16-4A4F-4A07-A19C-D109685ACF87}"/>
+                <a16:creationId xmlns:a16="http://schemas.microsoft.com/office/drawing/2014/main" id="{D4D9A419-CB72-4759-960E-88B2C91A4447}"/>
               </a:ext>
             </a:extLst>
           </p:cNvPr>
@@ -4889,8 +5075,8 @@
         </p:nvSpPr>
         <p:spPr>
           <a:xfrm>
-            <a:off x="1371600" y="1383528"/>
-            <a:ext cx="9601200" cy="842838"/>
+            <a:off x="1371600" y="1399432"/>
+            <a:ext cx="9601200" cy="1630016"/>
           </a:xfrm>
         </p:spPr>
         <p:txBody>
@@ -4899,362 +5085,133 @@
           <a:p>
             <a:r>
               <a:rPr lang="es-ES" b="1" dirty="0"/>
-              <a:t>Nombre</a:t>
+              <a:t>Origen: </a:t>
             </a:r>
             <a:r>
               <a:rPr lang="es-ES" dirty="0"/>
-              <a:t>: gráfico de barras.</a:t>
+              <a:t>repositorio público “</a:t>
+            </a:r>
+            <a:r>
+              <a:rPr lang="es-ES" i="1" dirty="0" err="1"/>
+              <a:t>Student</a:t>
+            </a:r>
+            <a:r>
+              <a:rPr lang="es-ES" i="1" dirty="0"/>
+              <a:t> Grade </a:t>
+            </a:r>
+            <a:r>
+              <a:rPr lang="es-ES" i="1" dirty="0" err="1"/>
+              <a:t>Predicton</a:t>
+            </a:r>
+            <a:r>
+              <a:rPr lang="es-ES" i="1" dirty="0"/>
+              <a:t>”</a:t>
+            </a:r>
+            <a:r>
+              <a:rPr lang="es-ES" dirty="0"/>
+              <a:t>, el cual se encuentra en </a:t>
+            </a:r>
+            <a:r>
+              <a:rPr lang="es-ES" i="1" dirty="0" err="1"/>
+              <a:t>Kaggle</a:t>
+            </a:r>
+            <a:r>
+              <a:rPr lang="es-ES" dirty="0"/>
+              <a:t> (</a:t>
+            </a:r>
+            <a:r>
+              <a:rPr lang="es-ES" i="1" dirty="0">
+                <a:hlinkClick r:id="rId2"/>
+              </a:rPr>
+              <a:t>https://www.kaggle.com/dipam7/student-grade-prediction</a:t>
+            </a:r>
+            <a:r>
+              <a:rPr lang="es-ES" dirty="0"/>
+              <a:t>).</a:t>
             </a:r>
           </a:p>
           <a:p>
             <a:r>
               <a:rPr lang="es-ES" b="1" dirty="0"/>
-              <a:t>Origen</a:t>
+              <a:t>Licencia:</a:t>
             </a:r>
             <a:r>
               <a:rPr lang="es-ES" dirty="0"/>
-              <a:t>: 1786 – William </a:t>
-            </a:r>
-            <a:r>
-              <a:rPr lang="es-ES" dirty="0" err="1"/>
-              <a:t>Playfair</a:t>
+              <a:t> no aparece en ningún sitio la licencia. </a:t>
+            </a:r>
+            <a:r>
+              <a:rPr lang="es-ES" i="1" dirty="0"/>
+              <a:t>(</a:t>
+            </a:r>
+            <a:r>
+              <a:rPr lang="es-ES" i="1" dirty="0" err="1"/>
+              <a:t>Kaggle</a:t>
+            </a:r>
+            <a:r>
+              <a:rPr lang="es-ES" i="1" dirty="0"/>
+              <a:t>, UCL Machine </a:t>
+            </a:r>
+            <a:r>
+              <a:rPr lang="es-ES" i="1" dirty="0" err="1"/>
+              <a:t>Learning</a:t>
+            </a:r>
+            <a:r>
+              <a:rPr lang="es-ES" i="1" dirty="0"/>
+              <a:t>)</a:t>
+            </a:r>
+          </a:p>
+          <a:p>
+            <a:r>
+              <a:rPr lang="es-ES" b="1" dirty="0"/>
+              <a:t>Tipo de fichero: </a:t>
             </a:r>
             <a:r>
               <a:rPr lang="es-ES" dirty="0"/>
-              <a:t>, aparece en su obra “Atlas Comercial y político”:</a:t>
-            </a:r>
-          </a:p>
-          <a:p>
-            <a:endParaRPr lang="es-ES" dirty="0"/>
+              <a:t>un fichero CSV con 33 atributos.</a:t>
+            </a:r>
+          </a:p>
+          <a:p>
+            <a:pPr marL="0" indent="0">
+              <a:buNone/>
+            </a:pPr>
+            <a:endParaRPr lang="es-ES" b="1" dirty="0"/>
           </a:p>
         </p:txBody>
       </p:sp>
       <p:pic>
         <p:nvPicPr>
-          <p:cNvPr id="1028" name="Picture 4">
+          <p:cNvPr id="7" name="Imagen 6">
             <a:extLst>
               <a:ext uri="{FF2B5EF4-FFF2-40B4-BE49-F238E27FC236}">
-                <a16:creationId xmlns:a16="http://schemas.microsoft.com/office/drawing/2014/main" id="{E5794437-12E3-40B2-B052-085F8773F87D}"/>
+                <a16:creationId xmlns:a16="http://schemas.microsoft.com/office/drawing/2014/main" id="{62E8D836-40BD-4A9E-B847-BC4062559A14}"/>
               </a:ext>
             </a:extLst>
           </p:cNvPr>
           <p:cNvPicPr>
-            <a:picLocks noChangeAspect="1" noChangeArrowheads="1"/>
+            <a:picLocks noChangeAspect="1"/>
           </p:cNvPicPr>
           <p:nvPr/>
         </p:nvPicPr>
         <p:blipFill>
-          <a:blip r:embed="rId2">
-            <a:extLst>
-              <a:ext uri="{28A0092B-C50C-407E-A947-70E740481C1C}">
-                <a14:useLocalDpi xmlns:a14="http://schemas.microsoft.com/office/drawing/2010/main" val="0"/>
-              </a:ext>
-            </a:extLst>
-          </a:blip>
-          <a:srcRect/>
+          <a:blip r:embed="rId3"/>
           <a:stretch>
             <a:fillRect/>
           </a:stretch>
         </p:blipFill>
-        <p:spPr bwMode="auto">
-          <a:xfrm>
-            <a:off x="3854486" y="2318143"/>
-            <a:ext cx="4483027" cy="3009232"/>
+        <p:spPr>
+          <a:xfrm>
+            <a:off x="2767012" y="3295649"/>
+            <a:ext cx="6657975" cy="2876550"/>
           </a:xfrm>
           <a:prstGeom prst="rect">
             <a:avLst/>
           </a:prstGeom>
-          <a:noFill/>
-          <a:extLst>
-            <a:ext uri="{909E8E84-426E-40DD-AFC4-6F175D3DCCD1}">
-              <a14:hiddenFill xmlns:a14="http://schemas.microsoft.com/office/drawing/2010/main">
-                <a:solidFill>
-                  <a:srgbClr val="FFFFFF"/>
-                </a:solidFill>
-              </a14:hiddenFill>
-            </a:ext>
-          </a:extLst>
         </p:spPr>
       </p:pic>
-      <p:sp>
-        <p:nvSpPr>
-          <p:cNvPr id="6" name="Marcador de contenido 2">
-            <a:extLst>
-              <a:ext uri="{FF2B5EF4-FFF2-40B4-BE49-F238E27FC236}">
-                <a16:creationId xmlns:a16="http://schemas.microsoft.com/office/drawing/2014/main" id="{EF63C03E-4934-4385-B954-C602BBC1E148}"/>
-              </a:ext>
-            </a:extLst>
-          </p:cNvPr>
-          <p:cNvSpPr txBox="1">
-            <a:spLocks/>
-          </p:cNvSpPr>
-          <p:nvPr/>
-        </p:nvSpPr>
-        <p:spPr>
-          <a:xfrm>
-            <a:off x="1371600" y="5750781"/>
-            <a:ext cx="9601200" cy="842838"/>
-          </a:xfrm>
-          <a:prstGeom prst="rect">
-            <a:avLst/>
-          </a:prstGeom>
-        </p:spPr>
-        <p:txBody>
-          <a:bodyPr vert="horz" lIns="91440" tIns="45720" rIns="91440" bIns="45720" rtlCol="0">
-            <a:normAutofit/>
-          </a:bodyPr>
-          <a:lstStyle>
-            <a:lvl1pPr marL="384048" indent="-384048" algn="l" defTabSz="914400" rtl="0" eaLnBrk="1" latinLnBrk="0" hangingPunct="1">
-              <a:lnSpc>
-                <a:spcPct val="94000"/>
-              </a:lnSpc>
-              <a:spcBef>
-                <a:spcPts val="1000"/>
-              </a:spcBef>
-              <a:spcAft>
-                <a:spcPts val="200"/>
-              </a:spcAft>
-              <a:buFont typeface="Franklin Gothic Book" panose="020B0503020102020204" pitchFamily="34" charset="0"/>
-              <a:buChar char="■"/>
-              <a:defRPr sz="2000" kern="1200" baseline="0">
-                <a:solidFill>
-                  <a:schemeClr val="tx2"/>
-                </a:solidFill>
-                <a:latin typeface="+mn-lt"/>
-                <a:ea typeface="+mn-ea"/>
-                <a:cs typeface="+mn-cs"/>
-              </a:defRPr>
-            </a:lvl1pPr>
-            <a:lvl2pPr marL="914400" indent="-384048" algn="l" defTabSz="914400" rtl="0" eaLnBrk="1" latinLnBrk="0" hangingPunct="1">
-              <a:lnSpc>
-                <a:spcPct val="94000"/>
-              </a:lnSpc>
-              <a:spcBef>
-                <a:spcPts val="500"/>
-              </a:spcBef>
-              <a:spcAft>
-                <a:spcPts val="200"/>
-              </a:spcAft>
-              <a:buFont typeface="Franklin Gothic Book" panose="020B0503020102020204" pitchFamily="34" charset="0"/>
-              <a:buChar char="–"/>
-              <a:defRPr sz="2000" i="1" kern="1200" baseline="0">
-                <a:solidFill>
-                  <a:schemeClr val="tx2"/>
-                </a:solidFill>
-                <a:latin typeface="+mn-lt"/>
-                <a:ea typeface="+mn-ea"/>
-                <a:cs typeface="+mn-cs"/>
-              </a:defRPr>
-            </a:lvl2pPr>
-            <a:lvl3pPr marL="1371600" indent="-384048" algn="l" defTabSz="914400" rtl="0" eaLnBrk="1" latinLnBrk="0" hangingPunct="1">
-              <a:lnSpc>
-                <a:spcPct val="94000"/>
-              </a:lnSpc>
-              <a:spcBef>
-                <a:spcPts val="500"/>
-              </a:spcBef>
-              <a:spcAft>
-                <a:spcPts val="200"/>
-              </a:spcAft>
-              <a:buFont typeface="Franklin Gothic Book" panose="020B0503020102020204" pitchFamily="34" charset="0"/>
-              <a:buChar char="■"/>
-              <a:defRPr sz="1800" kern="1200" baseline="0">
-                <a:solidFill>
-                  <a:schemeClr val="tx2"/>
-                </a:solidFill>
-                <a:latin typeface="+mn-lt"/>
-                <a:ea typeface="+mn-ea"/>
-                <a:cs typeface="+mn-cs"/>
-              </a:defRPr>
-            </a:lvl3pPr>
-            <a:lvl4pPr marL="1828800" indent="-384048" algn="l" defTabSz="914400" rtl="0" eaLnBrk="1" latinLnBrk="0" hangingPunct="1">
-              <a:lnSpc>
-                <a:spcPct val="94000"/>
-              </a:lnSpc>
-              <a:spcBef>
-                <a:spcPts val="500"/>
-              </a:spcBef>
-              <a:spcAft>
-                <a:spcPts val="200"/>
-              </a:spcAft>
-              <a:buFont typeface="Franklin Gothic Book" panose="020B0503020102020204" pitchFamily="34" charset="0"/>
-              <a:buChar char="–"/>
-              <a:defRPr sz="1800" i="1" kern="1200" baseline="0">
-                <a:solidFill>
-                  <a:schemeClr val="tx2"/>
-                </a:solidFill>
-                <a:latin typeface="+mn-lt"/>
-                <a:ea typeface="+mn-ea"/>
-                <a:cs typeface="+mn-cs"/>
-              </a:defRPr>
-            </a:lvl4pPr>
-            <a:lvl5pPr marL="2286000" indent="-384048" algn="l" defTabSz="914400" rtl="0" eaLnBrk="1" latinLnBrk="0" hangingPunct="1">
-              <a:lnSpc>
-                <a:spcPct val="94000"/>
-              </a:lnSpc>
-              <a:spcBef>
-                <a:spcPts val="500"/>
-              </a:spcBef>
-              <a:spcAft>
-                <a:spcPts val="200"/>
-              </a:spcAft>
-              <a:buFont typeface="Franklin Gothic Book" panose="020B0503020102020204" pitchFamily="34" charset="0"/>
-              <a:buChar char="■"/>
-              <a:defRPr sz="1600" kern="1200" baseline="0">
-                <a:solidFill>
-                  <a:schemeClr val="tx2"/>
-                </a:solidFill>
-                <a:latin typeface="+mn-lt"/>
-                <a:ea typeface="+mn-ea"/>
-                <a:cs typeface="+mn-cs"/>
-              </a:defRPr>
-            </a:lvl5pPr>
-            <a:lvl6pPr marL="2743200" indent="-384048" algn="l" defTabSz="914400" rtl="0" eaLnBrk="1" latinLnBrk="0" hangingPunct="1">
-              <a:lnSpc>
-                <a:spcPct val="94000"/>
-              </a:lnSpc>
-              <a:spcBef>
-                <a:spcPts val="500"/>
-              </a:spcBef>
-              <a:spcAft>
-                <a:spcPts val="200"/>
-              </a:spcAft>
-              <a:buFont typeface="Franklin Gothic Book" panose="020B0503020102020204" pitchFamily="34" charset="0"/>
-              <a:buChar char="–"/>
-              <a:defRPr sz="1600" i="1" kern="1200" baseline="0">
-                <a:solidFill>
-                  <a:schemeClr val="tx2"/>
-                </a:solidFill>
-                <a:latin typeface="+mn-lt"/>
-                <a:ea typeface="+mn-ea"/>
-                <a:cs typeface="+mn-cs"/>
-              </a:defRPr>
-            </a:lvl6pPr>
-            <a:lvl7pPr marL="3200400" indent="-384048" algn="l" defTabSz="914400" rtl="0" eaLnBrk="1" latinLnBrk="0" hangingPunct="1">
-              <a:lnSpc>
-                <a:spcPct val="94000"/>
-              </a:lnSpc>
-              <a:spcBef>
-                <a:spcPts val="500"/>
-              </a:spcBef>
-              <a:spcAft>
-                <a:spcPts val="200"/>
-              </a:spcAft>
-              <a:buFont typeface="Franklin Gothic Book" panose="020B0503020102020204" pitchFamily="34" charset="0"/>
-              <a:buChar char="■"/>
-              <a:defRPr sz="1400" kern="1200" baseline="0">
-                <a:solidFill>
-                  <a:schemeClr val="tx2"/>
-                </a:solidFill>
-                <a:latin typeface="+mn-lt"/>
-                <a:ea typeface="+mn-ea"/>
-                <a:cs typeface="+mn-cs"/>
-              </a:defRPr>
-            </a:lvl7pPr>
-            <a:lvl8pPr marL="3657600" indent="-384048" algn="l" defTabSz="914400" rtl="0" eaLnBrk="1" latinLnBrk="0" hangingPunct="1">
-              <a:lnSpc>
-                <a:spcPct val="94000"/>
-              </a:lnSpc>
-              <a:spcBef>
-                <a:spcPts val="500"/>
-              </a:spcBef>
-              <a:spcAft>
-                <a:spcPts val="200"/>
-              </a:spcAft>
-              <a:buFont typeface="Franklin Gothic Book" panose="020B0503020102020204" pitchFamily="34" charset="0"/>
-              <a:buChar char="–"/>
-              <a:defRPr sz="1400" i="1" kern="1200" baseline="0">
-                <a:solidFill>
-                  <a:schemeClr val="tx2"/>
-                </a:solidFill>
-                <a:latin typeface="+mn-lt"/>
-                <a:ea typeface="+mn-ea"/>
-                <a:cs typeface="+mn-cs"/>
-              </a:defRPr>
-            </a:lvl8pPr>
-            <a:lvl9pPr marL="4114800" indent="-384048" algn="l" defTabSz="914400" rtl="0" eaLnBrk="1" latinLnBrk="0" hangingPunct="1">
-              <a:lnSpc>
-                <a:spcPct val="94000"/>
-              </a:lnSpc>
-              <a:spcBef>
-                <a:spcPts val="500"/>
-              </a:spcBef>
-              <a:spcAft>
-                <a:spcPts val="200"/>
-              </a:spcAft>
-              <a:buFont typeface="Franklin Gothic Book" panose="020B0503020102020204" pitchFamily="34" charset="0"/>
-              <a:buChar char="■"/>
-              <a:defRPr sz="1400" kern="1200" baseline="0">
-                <a:solidFill>
-                  <a:schemeClr val="tx2"/>
-                </a:solidFill>
-                <a:latin typeface="+mn-lt"/>
-                <a:ea typeface="+mn-ea"/>
-                <a:cs typeface="+mn-cs"/>
-              </a:defRPr>
-            </a:lvl9pPr>
-          </a:lstStyle>
-          <a:p>
-            <a:r>
-              <a:rPr lang="es-ES" b="1" dirty="0"/>
-              <a:t>Descripción</a:t>
-            </a:r>
-            <a:r>
-              <a:rPr lang="es-ES" dirty="0"/>
-              <a:t>: representar la frecuencia de aparición a partir de barras rectangulares.</a:t>
-            </a:r>
-          </a:p>
-          <a:p>
-            <a:r>
-              <a:rPr lang="es-ES" b="1" dirty="0"/>
-              <a:t>Ejemplos</a:t>
-            </a:r>
-            <a:r>
-              <a:rPr lang="es-ES" dirty="0"/>
-              <a:t>: distribución de una variable, comparaciones entre variables…</a:t>
-            </a:r>
-          </a:p>
-        </p:txBody>
-      </p:sp>
-      <p:sp>
-        <p:nvSpPr>
-          <p:cNvPr id="8" name="CuadroTexto 7">
-            <a:extLst>
-              <a:ext uri="{FF2B5EF4-FFF2-40B4-BE49-F238E27FC236}">
-                <a16:creationId xmlns:a16="http://schemas.microsoft.com/office/drawing/2014/main" id="{78BB0037-1F03-4513-8E69-8B472A928FBE}"/>
-              </a:ext>
-            </a:extLst>
-          </p:cNvPr>
-          <p:cNvSpPr txBox="1"/>
-          <p:nvPr/>
-        </p:nvSpPr>
-        <p:spPr>
-          <a:xfrm>
-            <a:off x="3778858" y="5327375"/>
-            <a:ext cx="4558655" cy="276999"/>
-          </a:xfrm>
-          <a:prstGeom prst="rect">
-            <a:avLst/>
-          </a:prstGeom>
-          <a:noFill/>
-        </p:spPr>
-        <p:txBody>
-          <a:bodyPr wrap="square">
-            <a:spAutoFit/>
-          </a:bodyPr>
-          <a:lstStyle/>
-          <a:p>
-            <a:r>
-              <a:rPr lang="es-ES" sz="1200" i="1" dirty="0"/>
-              <a:t>https://assets.atlasobscura.com/article_images/31164/image.jpg</a:t>
-            </a:r>
-          </a:p>
-        </p:txBody>
-      </p:sp>
     </p:spTree>
     <p:extLst>
       <p:ext uri="{BB962C8B-B14F-4D97-AF65-F5344CB8AC3E}">
-        <p14:creationId xmlns:p14="http://schemas.microsoft.com/office/powerpoint/2010/main" val="627937430"/>
+        <p14:creationId xmlns:p14="http://schemas.microsoft.com/office/powerpoint/2010/main" val="182652102"/>
       </p:ext>
     </p:extLst>
   </p:cSld>
@@ -5286,7 +5243,7 @@
           <p:cNvPr id="2" name="Título 1">
             <a:extLst>
               <a:ext uri="{FF2B5EF4-FFF2-40B4-BE49-F238E27FC236}">
-                <a16:creationId xmlns:a16="http://schemas.microsoft.com/office/drawing/2014/main" id="{BC8274FF-01F0-4D29-8A42-39D7DF238A2B}"/>
+                <a16:creationId xmlns:a16="http://schemas.microsoft.com/office/drawing/2014/main" id="{B4F17BC3-3880-467D-A980-D57D78115850}"/>
               </a:ext>
             </a:extLst>
           </p:cNvPr>
@@ -5300,7 +5257,7 @@
         <p:spPr>
           <a:xfrm>
             <a:off x="1371600" y="685800"/>
-            <a:ext cx="9601200" cy="697727"/>
+            <a:ext cx="9601200" cy="753386"/>
           </a:xfrm>
         </p:spPr>
         <p:txBody>
@@ -5309,7 +5266,7 @@
           <a:p>
             <a:r>
               <a:rPr lang="es-ES" dirty="0"/>
-              <a:t>Definición de la técnica de visualización</a:t>
+              <a:t>Herramienta</a:t>
             </a:r>
           </a:p>
         </p:txBody>
@@ -5319,7 +5276,7 @@
           <p:cNvPr id="3" name="Marcador de contenido 2">
             <a:extLst>
               <a:ext uri="{FF2B5EF4-FFF2-40B4-BE49-F238E27FC236}">
-                <a16:creationId xmlns:a16="http://schemas.microsoft.com/office/drawing/2014/main" id="{F3C72A16-4A4F-4A07-A19C-D109685ACF87}"/>
+                <a16:creationId xmlns:a16="http://schemas.microsoft.com/office/drawing/2014/main" id="{19E6E0A1-04DC-4693-AC3E-FE93055F400B}"/>
               </a:ext>
             </a:extLst>
           </p:cNvPr>
@@ -5332,8 +5289,8 @@
         </p:nvSpPr>
         <p:spPr>
           <a:xfrm>
-            <a:off x="1371600" y="1582310"/>
-            <a:ext cx="9601200" cy="3339547"/>
+            <a:off x="1371600" y="1439186"/>
+            <a:ext cx="9601200" cy="4428214"/>
           </a:xfrm>
         </p:spPr>
         <p:txBody>
@@ -5341,55 +5298,124 @@
           <a:lstStyle/>
           <a:p>
             <a:r>
+              <a:rPr lang="es-ES" b="1" dirty="0" err="1"/>
+              <a:t>Infogram</a:t>
+            </a:r>
+            <a:r>
+              <a:rPr lang="es-ES" dirty="0"/>
+              <a:t>: es una plataforma web diseñada para la creación de visualizaciones, ya sean infografías o visualización de datos en sí.</a:t>
+            </a:r>
+          </a:p>
+          <a:p>
+            <a:r>
+              <a:rPr lang="es-ES" dirty="0"/>
+              <a:t>Las </a:t>
+            </a:r>
+            <a:r>
               <a:rPr lang="es-ES" b="1" dirty="0"/>
-              <a:t>Tipo de datos que representa</a:t>
+              <a:t>características</a:t>
             </a:r>
             <a:r>
               <a:rPr lang="es-ES" dirty="0"/>
-              <a:t>: datos cuantitativos (frecuencia):</a:t>
+              <a:t> principales son:</a:t>
             </a:r>
           </a:p>
           <a:p>
             <a:pPr lvl="1"/>
             <a:r>
-              <a:rPr lang="es-ES" i="0" dirty="0"/>
-              <a:t>Frecuencia absoluta.</a:t>
+              <a:rPr lang="es-ES" dirty="0"/>
+              <a:t>Interfaz web.</a:t>
             </a:r>
           </a:p>
           <a:p>
             <a:pPr lvl="1"/>
             <a:r>
-              <a:rPr lang="es-ES" i="0" dirty="0"/>
-              <a:t>Frecuencia relativa (%).</a:t>
-            </a:r>
-          </a:p>
-          <a:p>
-            <a:r>
-              <a:rPr lang="es-ES" b="1" dirty="0"/>
-              <a:t>Estructura de los datos</a:t>
-            </a:r>
-            <a:r>
               <a:rPr lang="es-ES" dirty="0"/>
-              <a:t>: a nivel atómico una categoría debe tener un solo valor.</a:t>
-            </a:r>
-          </a:p>
-          <a:p>
-            <a:r>
-              <a:rPr lang="es-ES" b="1" dirty="0"/>
-              <a:t>Limitación del juego de datos</a:t>
-            </a:r>
+              <a:t>Intuitiva.</a:t>
+            </a:r>
+          </a:p>
+          <a:p>
+            <a:pPr lvl="1"/>
             <a:r>
               <a:rPr lang="es-ES" dirty="0"/>
-              <a:t>: sí que hay limitación, el juego de datos tiene que estar acotado (mínimo, máximo).</a:t>
-            </a:r>
-            <a:endParaRPr lang="es-ES" b="1" dirty="0"/>
-          </a:p>
-        </p:txBody>
-      </p:sp>
+              <a:t>Fácil de usar.</a:t>
+            </a:r>
+          </a:p>
+          <a:p>
+            <a:pPr lvl="1"/>
+            <a:r>
+              <a:rPr lang="es-ES" dirty="0"/>
+              <a:t>Creación de gráficos, cuadros de mando, mapas, </a:t>
+            </a:r>
+            <a:r>
+              <a:rPr lang="es-ES" dirty="0" err="1"/>
+              <a:t>storytellings</a:t>
+            </a:r>
+            <a:r>
+              <a:rPr lang="es-ES" dirty="0"/>
+              <a:t>…</a:t>
+            </a:r>
+          </a:p>
+          <a:p>
+            <a:pPr lvl="1"/>
+            <a:r>
+              <a:rPr lang="es-ES" dirty="0"/>
+              <a:t>Versión gratuita (Limitada).</a:t>
+            </a:r>
+          </a:p>
+        </p:txBody>
+      </p:sp>
+      <p:pic>
+        <p:nvPicPr>
+          <p:cNvPr id="1032" name="Picture 8" descr="Herramienta: Infogram » Recursos educativos digitales">
+            <a:extLst>
+              <a:ext uri="{FF2B5EF4-FFF2-40B4-BE49-F238E27FC236}">
+                <a16:creationId xmlns:a16="http://schemas.microsoft.com/office/drawing/2014/main" id="{92E1F77A-87FB-4D51-A031-40EA6B877ED3}"/>
+              </a:ext>
+            </a:extLst>
+          </p:cNvPr>
+          <p:cNvPicPr>
+            <a:picLocks noChangeAspect="1" noChangeArrowheads="1"/>
+          </p:cNvPicPr>
+          <p:nvPr/>
+        </p:nvPicPr>
+        <p:blipFill>
+          <a:blip r:embed="rId2">
+            <a:extLst>
+              <a:ext uri="{28A0092B-C50C-407E-A947-70E740481C1C}">
+                <a14:useLocalDpi xmlns:a14="http://schemas.microsoft.com/office/drawing/2010/main" val="0"/>
+              </a:ext>
+            </a:extLst>
+          </a:blip>
+          <a:srcRect/>
+          <a:stretch>
+            <a:fillRect/>
+          </a:stretch>
+        </p:blipFill>
+        <p:spPr bwMode="auto">
+          <a:xfrm>
+            <a:off x="6096000" y="447260"/>
+            <a:ext cx="5665231" cy="4577964"/>
+          </a:xfrm>
+          <a:prstGeom prst="rect">
+            <a:avLst/>
+          </a:prstGeom>
+          <a:noFill/>
+          <a:extLst>
+            <a:ext uri="{909E8E84-426E-40DD-AFC4-6F175D3DCCD1}">
+              <a14:hiddenFill xmlns:a14="http://schemas.microsoft.com/office/drawing/2010/main">
+                <a:solidFill>
+                  <a:srgbClr val="FFFFFF"/>
+                </a:solidFill>
+              </a14:hiddenFill>
+            </a:ext>
+          </a:extLst>
+        </p:spPr>
+      </p:pic>
     </p:spTree>
     <p:extLst>
       <p:ext uri="{BB962C8B-B14F-4D97-AF65-F5344CB8AC3E}">
-        <p14:creationId xmlns:p14="http://schemas.microsoft.com/office/powerpoint/2010/main" val="2061827972"/>
+        <p14:creationId xmlns:p14="http://schemas.microsoft.com/office/powerpoint/2010/main" val="2573892479"/>
       </p:ext>
     </p:extLst>
   </p:cSld>
@@ -5421,7 +5447,7 @@
           <p:cNvPr id="2" name="Título 1">
             <a:extLst>
               <a:ext uri="{FF2B5EF4-FFF2-40B4-BE49-F238E27FC236}">
-                <a16:creationId xmlns:a16="http://schemas.microsoft.com/office/drawing/2014/main" id="{C975D6E1-9488-4C0E-A451-4F7F4DBA007B}"/>
+                <a16:creationId xmlns:a16="http://schemas.microsoft.com/office/drawing/2014/main" id="{01E19CC7-A49E-424C-81F2-CECE16590C61}"/>
               </a:ext>
             </a:extLst>
           </p:cNvPr>
@@ -5435,7 +5461,7 @@
         <p:spPr>
           <a:xfrm>
             <a:off x="1371600" y="685800"/>
-            <a:ext cx="9601200" cy="721581"/>
+            <a:ext cx="9601200" cy="745435"/>
           </a:xfrm>
         </p:spPr>
         <p:txBody>
@@ -5444,24 +5470,26 @@
           <a:p>
             <a:r>
               <a:rPr lang="es-ES" dirty="0"/>
-              <a:t>Representación del gráfico de barras</a:t>
+              <a:t>Navegación</a:t>
             </a:r>
           </a:p>
         </p:txBody>
       </p:sp>
       <p:pic>
         <p:nvPicPr>
-          <p:cNvPr id="4" name="Imagen 3">
+          <p:cNvPr id="5" name="Marcador de contenido 4">
             <a:extLst>
               <a:ext uri="{FF2B5EF4-FFF2-40B4-BE49-F238E27FC236}">
-                <a16:creationId xmlns:a16="http://schemas.microsoft.com/office/drawing/2014/main" id="{981E8072-B0EC-446B-A6A1-9962B15C915D}"/>
+                <a16:creationId xmlns:a16="http://schemas.microsoft.com/office/drawing/2014/main" id="{47EB1D5A-561C-4D31-87EE-A652B6668C14}"/>
               </a:ext>
             </a:extLst>
           </p:cNvPr>
           <p:cNvPicPr>
-            <a:picLocks noChangeAspect="1"/>
+            <a:picLocks noGrp="1" noChangeAspect="1"/>
           </p:cNvPicPr>
-          <p:nvPr/>
+          <p:nvPr>
+            <p:ph idx="1"/>
+          </p:nvPr>
         </p:nvPicPr>
         <p:blipFill>
           <a:blip r:embed="rId2"/>
@@ -5471,18 +5499,15 @@
         </p:blipFill>
         <p:spPr>
           <a:xfrm>
-            <a:off x="2953246" y="1606164"/>
-            <a:ext cx="6285507" cy="4769266"/>
-          </a:xfrm>
-          <a:prstGeom prst="rect">
-            <a:avLst/>
-          </a:prstGeom>
+            <a:off x="2157633" y="1944686"/>
+            <a:ext cx="7876733" cy="3629177"/>
+          </a:xfrm>
         </p:spPr>
       </p:pic>
     </p:spTree>
     <p:extLst>
       <p:ext uri="{BB962C8B-B14F-4D97-AF65-F5344CB8AC3E}">
-        <p14:creationId xmlns:p14="http://schemas.microsoft.com/office/powerpoint/2010/main" val="2393056908"/>
+        <p14:creationId xmlns:p14="http://schemas.microsoft.com/office/powerpoint/2010/main" val="2878091765"/>
       </p:ext>
     </p:extLst>
   </p:cSld>
@@ -5514,7 +5539,7 @@
           <p:cNvPr id="2" name="Título 1">
             <a:extLst>
               <a:ext uri="{FF2B5EF4-FFF2-40B4-BE49-F238E27FC236}">
-                <a16:creationId xmlns:a16="http://schemas.microsoft.com/office/drawing/2014/main" id="{DAA4DABF-1EB7-47D6-B449-C6454560C629}"/>
+                <a16:creationId xmlns:a16="http://schemas.microsoft.com/office/drawing/2014/main" id="{01E19CC7-A49E-424C-81F2-CECE16590C61}"/>
               </a:ext>
             </a:extLst>
           </p:cNvPr>
@@ -5528,42 +5553,35 @@
         <p:spPr>
           <a:xfrm>
             <a:off x="1371600" y="685800"/>
-            <a:ext cx="9601200" cy="912412"/>
-          </a:xfrm>
-        </p:spPr>
-        <p:txBody>
-          <a:bodyPr>
-            <a:normAutofit/>
-          </a:bodyPr>
+            <a:ext cx="9601200" cy="745435"/>
+          </a:xfrm>
+        </p:spPr>
+        <p:txBody>
+          <a:bodyPr/>
           <a:lstStyle/>
           <a:p>
             <a:r>
               <a:rPr lang="es-ES" dirty="0"/>
-              <a:t>Gráfico de cascada</a:t>
-            </a:r>
-            <a:br>
-              <a:rPr lang="es-ES" dirty="0"/>
-            </a:br>
-            <a:r>
-              <a:rPr lang="es-ES" sz="1600" i="1" dirty="0"/>
-              <a:t>https://infogram.com/evolucion-compraventa-viviendas-1h7k230romd0v2x?live</a:t>
+              <a:t>Navegación</a:t>
             </a:r>
           </a:p>
         </p:txBody>
       </p:sp>
       <p:pic>
         <p:nvPicPr>
-          <p:cNvPr id="4" name="Imagen 3">
+          <p:cNvPr id="9" name="Marcador de contenido 8">
             <a:extLst>
               <a:ext uri="{FF2B5EF4-FFF2-40B4-BE49-F238E27FC236}">
-                <a16:creationId xmlns:a16="http://schemas.microsoft.com/office/drawing/2014/main" id="{341EE472-F679-4395-B8A1-B80EF7614EDA}"/>
+                <a16:creationId xmlns:a16="http://schemas.microsoft.com/office/drawing/2014/main" id="{F32681D9-68F5-43E6-8A7E-C08705EBD768}"/>
               </a:ext>
             </a:extLst>
           </p:cNvPr>
           <p:cNvPicPr>
-            <a:picLocks noChangeAspect="1"/>
+            <a:picLocks noGrp="1" noChangeAspect="1"/>
           </p:cNvPicPr>
-          <p:nvPr/>
+          <p:nvPr>
+            <p:ph idx="1"/>
+          </p:nvPr>
         </p:nvPicPr>
         <p:blipFill>
           <a:blip r:embed="rId2"/>
@@ -5573,18 +5591,15 @@
         </p:blipFill>
         <p:spPr>
           <a:xfrm>
-            <a:off x="3126270" y="1895434"/>
-            <a:ext cx="5939459" cy="4545372"/>
-          </a:xfrm>
-          <a:prstGeom prst="rect">
-            <a:avLst/>
-          </a:prstGeom>
+            <a:off x="2337393" y="1934528"/>
+            <a:ext cx="7517214" cy="3758607"/>
+          </a:xfrm>
         </p:spPr>
       </p:pic>
     </p:spTree>
     <p:extLst>
       <p:ext uri="{BB962C8B-B14F-4D97-AF65-F5344CB8AC3E}">
-        <p14:creationId xmlns:p14="http://schemas.microsoft.com/office/powerpoint/2010/main" val="911669849"/>
+        <p14:creationId xmlns:p14="http://schemas.microsoft.com/office/powerpoint/2010/main" val="883134478"/>
       </p:ext>
     </p:extLst>
   </p:cSld>
@@ -5616,7 +5631,7 @@
           <p:cNvPr id="2" name="Título 1">
             <a:extLst>
               <a:ext uri="{FF2B5EF4-FFF2-40B4-BE49-F238E27FC236}">
-                <a16:creationId xmlns:a16="http://schemas.microsoft.com/office/drawing/2014/main" id="{BC8274FF-01F0-4D29-8A42-39D7DF238A2B}"/>
+                <a16:creationId xmlns:a16="http://schemas.microsoft.com/office/drawing/2014/main" id="{01E19CC7-A49E-424C-81F2-CECE16590C61}"/>
               </a:ext>
             </a:extLst>
           </p:cNvPr>
@@ -5630,7 +5645,7 @@
         <p:spPr>
           <a:xfrm>
             <a:off x="1371600" y="685800"/>
-            <a:ext cx="9601200" cy="697727"/>
+            <a:ext cx="9601200" cy="745435"/>
           </a:xfrm>
         </p:spPr>
         <p:txBody>
@@ -5639,392 +5654,44 @@
           <a:p>
             <a:r>
               <a:rPr lang="es-ES" dirty="0"/>
-              <a:t>Definición de la técnica de visualización</a:t>
-            </a:r>
-          </a:p>
-        </p:txBody>
-      </p:sp>
-      <p:sp>
-        <p:nvSpPr>
-          <p:cNvPr id="3" name="Marcador de contenido 2">
+              <a:t>Navegación</a:t>
+            </a:r>
+          </a:p>
+        </p:txBody>
+      </p:sp>
+      <p:pic>
+        <p:nvPicPr>
+          <p:cNvPr id="7" name="Marcador de contenido 6">
             <a:extLst>
               <a:ext uri="{FF2B5EF4-FFF2-40B4-BE49-F238E27FC236}">
-                <a16:creationId xmlns:a16="http://schemas.microsoft.com/office/drawing/2014/main" id="{F3C72A16-4A4F-4A07-A19C-D109685ACF87}"/>
-              </a:ext>
-            </a:extLst>
-          </p:cNvPr>
-          <p:cNvSpPr>
-            <a:spLocks noGrp="1"/>
-          </p:cNvSpPr>
-          <p:nvPr>
-            <p:ph idx="1"/>
-          </p:nvPr>
-        </p:nvSpPr>
-        <p:spPr>
-          <a:xfrm>
-            <a:off x="1371600" y="1383528"/>
-            <a:ext cx="9601200" cy="842838"/>
-          </a:xfrm>
-        </p:spPr>
-        <p:txBody>
-          <a:bodyPr/>
-          <a:lstStyle/>
-          <a:p>
-            <a:r>
-              <a:rPr lang="es-ES" b="1" dirty="0"/>
-              <a:t>Nombre</a:t>
-            </a:r>
-            <a:r>
-              <a:rPr lang="es-ES" dirty="0"/>
-              <a:t>: gráfico de cascada.</a:t>
-            </a:r>
-          </a:p>
-          <a:p>
-            <a:r>
-              <a:rPr lang="es-ES" b="1" dirty="0"/>
-              <a:t>Origen</a:t>
-            </a:r>
-            <a:r>
-              <a:rPr lang="es-ES" dirty="0"/>
-              <a:t>: desconocido, pero popularizado por McKinsey &amp; Company:</a:t>
-            </a:r>
-          </a:p>
-        </p:txBody>
-      </p:sp>
-      <p:sp>
-        <p:nvSpPr>
-          <p:cNvPr id="6" name="Marcador de contenido 2">
-            <a:extLst>
-              <a:ext uri="{FF2B5EF4-FFF2-40B4-BE49-F238E27FC236}">
-                <a16:creationId xmlns:a16="http://schemas.microsoft.com/office/drawing/2014/main" id="{EF63C03E-4934-4385-B954-C602BBC1E148}"/>
-              </a:ext>
-            </a:extLst>
-          </p:cNvPr>
-          <p:cNvSpPr txBox="1">
-            <a:spLocks/>
-          </p:cNvSpPr>
-          <p:nvPr/>
-        </p:nvSpPr>
-        <p:spPr>
-          <a:xfrm>
-            <a:off x="1371600" y="5750781"/>
-            <a:ext cx="9601200" cy="842838"/>
-          </a:xfrm>
-          <a:prstGeom prst="rect">
-            <a:avLst/>
-          </a:prstGeom>
-        </p:spPr>
-        <p:txBody>
-          <a:bodyPr vert="horz" lIns="91440" tIns="45720" rIns="91440" bIns="45720" rtlCol="0">
-            <a:normAutofit/>
-          </a:bodyPr>
-          <a:lstStyle>
-            <a:lvl1pPr marL="384048" indent="-384048" algn="l" defTabSz="914400" rtl="0" eaLnBrk="1" latinLnBrk="0" hangingPunct="1">
-              <a:lnSpc>
-                <a:spcPct val="94000"/>
-              </a:lnSpc>
-              <a:spcBef>
-                <a:spcPts val="1000"/>
-              </a:spcBef>
-              <a:spcAft>
-                <a:spcPts val="200"/>
-              </a:spcAft>
-              <a:buFont typeface="Franklin Gothic Book" panose="020B0503020102020204" pitchFamily="34" charset="0"/>
-              <a:buChar char="■"/>
-              <a:defRPr sz="2000" kern="1200" baseline="0">
-                <a:solidFill>
-                  <a:schemeClr val="tx2"/>
-                </a:solidFill>
-                <a:latin typeface="+mn-lt"/>
-                <a:ea typeface="+mn-ea"/>
-                <a:cs typeface="+mn-cs"/>
-              </a:defRPr>
-            </a:lvl1pPr>
-            <a:lvl2pPr marL="914400" indent="-384048" algn="l" defTabSz="914400" rtl="0" eaLnBrk="1" latinLnBrk="0" hangingPunct="1">
-              <a:lnSpc>
-                <a:spcPct val="94000"/>
-              </a:lnSpc>
-              <a:spcBef>
-                <a:spcPts val="500"/>
-              </a:spcBef>
-              <a:spcAft>
-                <a:spcPts val="200"/>
-              </a:spcAft>
-              <a:buFont typeface="Franklin Gothic Book" panose="020B0503020102020204" pitchFamily="34" charset="0"/>
-              <a:buChar char="–"/>
-              <a:defRPr sz="2000" i="1" kern="1200" baseline="0">
-                <a:solidFill>
-                  <a:schemeClr val="tx2"/>
-                </a:solidFill>
-                <a:latin typeface="+mn-lt"/>
-                <a:ea typeface="+mn-ea"/>
-                <a:cs typeface="+mn-cs"/>
-              </a:defRPr>
-            </a:lvl2pPr>
-            <a:lvl3pPr marL="1371600" indent="-384048" algn="l" defTabSz="914400" rtl="0" eaLnBrk="1" latinLnBrk="0" hangingPunct="1">
-              <a:lnSpc>
-                <a:spcPct val="94000"/>
-              </a:lnSpc>
-              <a:spcBef>
-                <a:spcPts val="500"/>
-              </a:spcBef>
-              <a:spcAft>
-                <a:spcPts val="200"/>
-              </a:spcAft>
-              <a:buFont typeface="Franklin Gothic Book" panose="020B0503020102020204" pitchFamily="34" charset="0"/>
-              <a:buChar char="■"/>
-              <a:defRPr sz="1800" kern="1200" baseline="0">
-                <a:solidFill>
-                  <a:schemeClr val="tx2"/>
-                </a:solidFill>
-                <a:latin typeface="+mn-lt"/>
-                <a:ea typeface="+mn-ea"/>
-                <a:cs typeface="+mn-cs"/>
-              </a:defRPr>
-            </a:lvl3pPr>
-            <a:lvl4pPr marL="1828800" indent="-384048" algn="l" defTabSz="914400" rtl="0" eaLnBrk="1" latinLnBrk="0" hangingPunct="1">
-              <a:lnSpc>
-                <a:spcPct val="94000"/>
-              </a:lnSpc>
-              <a:spcBef>
-                <a:spcPts val="500"/>
-              </a:spcBef>
-              <a:spcAft>
-                <a:spcPts val="200"/>
-              </a:spcAft>
-              <a:buFont typeface="Franklin Gothic Book" panose="020B0503020102020204" pitchFamily="34" charset="0"/>
-              <a:buChar char="–"/>
-              <a:defRPr sz="1800" i="1" kern="1200" baseline="0">
-                <a:solidFill>
-                  <a:schemeClr val="tx2"/>
-                </a:solidFill>
-                <a:latin typeface="+mn-lt"/>
-                <a:ea typeface="+mn-ea"/>
-                <a:cs typeface="+mn-cs"/>
-              </a:defRPr>
-            </a:lvl4pPr>
-            <a:lvl5pPr marL="2286000" indent="-384048" algn="l" defTabSz="914400" rtl="0" eaLnBrk="1" latinLnBrk="0" hangingPunct="1">
-              <a:lnSpc>
-                <a:spcPct val="94000"/>
-              </a:lnSpc>
-              <a:spcBef>
-                <a:spcPts val="500"/>
-              </a:spcBef>
-              <a:spcAft>
-                <a:spcPts val="200"/>
-              </a:spcAft>
-              <a:buFont typeface="Franklin Gothic Book" panose="020B0503020102020204" pitchFamily="34" charset="0"/>
-              <a:buChar char="■"/>
-              <a:defRPr sz="1600" kern="1200" baseline="0">
-                <a:solidFill>
-                  <a:schemeClr val="tx2"/>
-                </a:solidFill>
-                <a:latin typeface="+mn-lt"/>
-                <a:ea typeface="+mn-ea"/>
-                <a:cs typeface="+mn-cs"/>
-              </a:defRPr>
-            </a:lvl5pPr>
-            <a:lvl6pPr marL="2743200" indent="-384048" algn="l" defTabSz="914400" rtl="0" eaLnBrk="1" latinLnBrk="0" hangingPunct="1">
-              <a:lnSpc>
-                <a:spcPct val="94000"/>
-              </a:lnSpc>
-              <a:spcBef>
-                <a:spcPts val="500"/>
-              </a:spcBef>
-              <a:spcAft>
-                <a:spcPts val="200"/>
-              </a:spcAft>
-              <a:buFont typeface="Franklin Gothic Book" panose="020B0503020102020204" pitchFamily="34" charset="0"/>
-              <a:buChar char="–"/>
-              <a:defRPr sz="1600" i="1" kern="1200" baseline="0">
-                <a:solidFill>
-                  <a:schemeClr val="tx2"/>
-                </a:solidFill>
-                <a:latin typeface="+mn-lt"/>
-                <a:ea typeface="+mn-ea"/>
-                <a:cs typeface="+mn-cs"/>
-              </a:defRPr>
-            </a:lvl6pPr>
-            <a:lvl7pPr marL="3200400" indent="-384048" algn="l" defTabSz="914400" rtl="0" eaLnBrk="1" latinLnBrk="0" hangingPunct="1">
-              <a:lnSpc>
-                <a:spcPct val="94000"/>
-              </a:lnSpc>
-              <a:spcBef>
-                <a:spcPts val="500"/>
-              </a:spcBef>
-              <a:spcAft>
-                <a:spcPts val="200"/>
-              </a:spcAft>
-              <a:buFont typeface="Franklin Gothic Book" panose="020B0503020102020204" pitchFamily="34" charset="0"/>
-              <a:buChar char="■"/>
-              <a:defRPr sz="1400" kern="1200" baseline="0">
-                <a:solidFill>
-                  <a:schemeClr val="tx2"/>
-                </a:solidFill>
-                <a:latin typeface="+mn-lt"/>
-                <a:ea typeface="+mn-ea"/>
-                <a:cs typeface="+mn-cs"/>
-              </a:defRPr>
-            </a:lvl7pPr>
-            <a:lvl8pPr marL="3657600" indent="-384048" algn="l" defTabSz="914400" rtl="0" eaLnBrk="1" latinLnBrk="0" hangingPunct="1">
-              <a:lnSpc>
-                <a:spcPct val="94000"/>
-              </a:lnSpc>
-              <a:spcBef>
-                <a:spcPts val="500"/>
-              </a:spcBef>
-              <a:spcAft>
-                <a:spcPts val="200"/>
-              </a:spcAft>
-              <a:buFont typeface="Franklin Gothic Book" panose="020B0503020102020204" pitchFamily="34" charset="0"/>
-              <a:buChar char="–"/>
-              <a:defRPr sz="1400" i="1" kern="1200" baseline="0">
-                <a:solidFill>
-                  <a:schemeClr val="tx2"/>
-                </a:solidFill>
-                <a:latin typeface="+mn-lt"/>
-                <a:ea typeface="+mn-ea"/>
-                <a:cs typeface="+mn-cs"/>
-              </a:defRPr>
-            </a:lvl8pPr>
-            <a:lvl9pPr marL="4114800" indent="-384048" algn="l" defTabSz="914400" rtl="0" eaLnBrk="1" latinLnBrk="0" hangingPunct="1">
-              <a:lnSpc>
-                <a:spcPct val="94000"/>
-              </a:lnSpc>
-              <a:spcBef>
-                <a:spcPts val="500"/>
-              </a:spcBef>
-              <a:spcAft>
-                <a:spcPts val="200"/>
-              </a:spcAft>
-              <a:buFont typeface="Franklin Gothic Book" panose="020B0503020102020204" pitchFamily="34" charset="0"/>
-              <a:buChar char="■"/>
-              <a:defRPr sz="1400" kern="1200" baseline="0">
-                <a:solidFill>
-                  <a:schemeClr val="tx2"/>
-                </a:solidFill>
-                <a:latin typeface="+mn-lt"/>
-                <a:ea typeface="+mn-ea"/>
-                <a:cs typeface="+mn-cs"/>
-              </a:defRPr>
-            </a:lvl9pPr>
-          </a:lstStyle>
-          <a:p>
-            <a:r>
-              <a:rPr lang="es-ES" b="1" dirty="0"/>
-              <a:t>Descripción</a:t>
-            </a:r>
-            <a:r>
-              <a:rPr lang="es-ES" dirty="0"/>
-              <a:t>: representa el efecto acumulativo (+, -) durante un tiempo/categorías.</a:t>
-            </a:r>
-          </a:p>
-          <a:p>
-            <a:r>
-              <a:rPr lang="es-ES" b="1" dirty="0"/>
-              <a:t>Ejemplos</a:t>
-            </a:r>
-            <a:r>
-              <a:rPr lang="es-ES" dirty="0"/>
-              <a:t>: contabilidad/finanzas de una compañía, evolución de un </a:t>
-            </a:r>
-            <a:r>
-              <a:rPr lang="es-ES" u="sng" dirty="0"/>
-              <a:t>sector</a:t>
-            </a:r>
-            <a:r>
-              <a:rPr lang="es-ES" dirty="0"/>
-              <a:t>…</a:t>
-            </a:r>
-          </a:p>
-        </p:txBody>
-      </p:sp>
-      <p:sp>
-        <p:nvSpPr>
-          <p:cNvPr id="8" name="CuadroTexto 7">
-            <a:extLst>
-              <a:ext uri="{FF2B5EF4-FFF2-40B4-BE49-F238E27FC236}">
-                <a16:creationId xmlns:a16="http://schemas.microsoft.com/office/drawing/2014/main" id="{78BB0037-1F03-4513-8E69-8B472A928FBE}"/>
-              </a:ext>
-            </a:extLst>
-          </p:cNvPr>
-          <p:cNvSpPr txBox="1"/>
-          <p:nvPr/>
-        </p:nvSpPr>
-        <p:spPr>
-          <a:xfrm>
-            <a:off x="3752850" y="5243720"/>
-            <a:ext cx="4059711" cy="276999"/>
-          </a:xfrm>
-          <a:prstGeom prst="rect">
-            <a:avLst/>
-          </a:prstGeom>
-          <a:noFill/>
-        </p:spPr>
-        <p:txBody>
-          <a:bodyPr wrap="square">
-            <a:spAutoFit/>
-          </a:bodyPr>
-          <a:lstStyle/>
-          <a:p>
-            <a:r>
-              <a:rPr lang="es-ES" sz="1200" i="1" dirty="0"/>
-              <a:t>https://es.wikipedia.org/wiki/Gr%C3%A1fico_de_cascada</a:t>
-            </a:r>
-          </a:p>
-        </p:txBody>
-      </p:sp>
-      <p:pic>
-        <p:nvPicPr>
-          <p:cNvPr id="2050" name="Picture 2" descr="A waterfall chart showing profitability analysis.">
-            <a:extLst>
-              <a:ext uri="{FF2B5EF4-FFF2-40B4-BE49-F238E27FC236}">
-                <a16:creationId xmlns:a16="http://schemas.microsoft.com/office/drawing/2014/main" id="{DBF54062-6538-40F3-B06D-15A9EF6A78BC}"/>
+                <a16:creationId xmlns:a16="http://schemas.microsoft.com/office/drawing/2014/main" id="{B0065C31-1806-4B46-A37A-87E85F5B5F55}"/>
               </a:ext>
             </a:extLst>
           </p:cNvPr>
           <p:cNvPicPr>
-            <a:picLocks noChangeAspect="1" noChangeArrowheads="1"/>
+            <a:picLocks noGrp="1" noChangeAspect="1"/>
           </p:cNvPicPr>
-          <p:nvPr/>
+          <p:nvPr>
+            <p:ph idx="1"/>
+          </p:nvPr>
         </p:nvPicPr>
         <p:blipFill>
-          <a:blip r:embed="rId2">
-            <a:extLst>
-              <a:ext uri="{28A0092B-C50C-407E-A947-70E740481C1C}">
-                <a14:useLocalDpi xmlns:a14="http://schemas.microsoft.com/office/drawing/2010/main" val="0"/>
-              </a:ext>
-            </a:extLst>
-          </a:blip>
-          <a:srcRect/>
+          <a:blip r:embed="rId2"/>
           <a:stretch>
             <a:fillRect/>
           </a:stretch>
         </p:blipFill>
-        <p:spPr bwMode="auto">
-          <a:xfrm>
-            <a:off x="3752850" y="2310020"/>
-            <a:ext cx="4838700" cy="2933700"/>
-          </a:xfrm>
-          <a:prstGeom prst="rect">
-            <a:avLst/>
-          </a:prstGeom>
-          <a:noFill/>
-          <a:extLst>
-            <a:ext uri="{909E8E84-426E-40DD-AFC4-6F175D3DCCD1}">
-              <a14:hiddenFill xmlns:a14="http://schemas.microsoft.com/office/drawing/2010/main">
-                <a:solidFill>
-                  <a:srgbClr val="FFFFFF"/>
-                </a:solidFill>
-              </a14:hiddenFill>
-            </a:ext>
-          </a:extLst>
+        <p:spPr>
+          <a:xfrm>
+            <a:off x="3367912" y="1941587"/>
+            <a:ext cx="5456175" cy="4230613"/>
+          </a:xfrm>
         </p:spPr>
       </p:pic>
     </p:spTree>
     <p:extLst>
       <p:ext uri="{BB962C8B-B14F-4D97-AF65-F5344CB8AC3E}">
-        <p14:creationId xmlns:p14="http://schemas.microsoft.com/office/powerpoint/2010/main" val="3021059106"/>
+        <p14:creationId xmlns:p14="http://schemas.microsoft.com/office/powerpoint/2010/main" val="267344648"/>
       </p:ext>
     </p:extLst>
   </p:cSld>
@@ -6056,7 +5723,7 @@
           <p:cNvPr id="2" name="Título 1">
             <a:extLst>
               <a:ext uri="{FF2B5EF4-FFF2-40B4-BE49-F238E27FC236}">
-                <a16:creationId xmlns:a16="http://schemas.microsoft.com/office/drawing/2014/main" id="{BC8274FF-01F0-4D29-8A42-39D7DF238A2B}"/>
+                <a16:creationId xmlns:a16="http://schemas.microsoft.com/office/drawing/2014/main" id="{01E19CC7-A49E-424C-81F2-CECE16590C61}"/>
               </a:ext>
             </a:extLst>
           </p:cNvPr>
@@ -6070,7 +5737,7 @@
         <p:spPr>
           <a:xfrm>
             <a:off x="1371600" y="685800"/>
-            <a:ext cx="9601200" cy="697727"/>
+            <a:ext cx="9601200" cy="745435"/>
           </a:xfrm>
         </p:spPr>
         <p:txBody>
@@ -6079,95 +5746,44 @@
           <a:p>
             <a:r>
               <a:rPr lang="es-ES" dirty="0"/>
-              <a:t>Definición de la técnica de visualización</a:t>
-            </a:r>
-          </a:p>
-        </p:txBody>
-      </p:sp>
-      <p:sp>
-        <p:nvSpPr>
-          <p:cNvPr id="3" name="Marcador de contenido 2">
+              <a:t>Navegación</a:t>
+            </a:r>
+          </a:p>
+        </p:txBody>
+      </p:sp>
+      <p:pic>
+        <p:nvPicPr>
+          <p:cNvPr id="9" name="Marcador de contenido 8">
             <a:extLst>
               <a:ext uri="{FF2B5EF4-FFF2-40B4-BE49-F238E27FC236}">
-                <a16:creationId xmlns:a16="http://schemas.microsoft.com/office/drawing/2014/main" id="{F3C72A16-4A4F-4A07-A19C-D109685ACF87}"/>
+                <a16:creationId xmlns:a16="http://schemas.microsoft.com/office/drawing/2014/main" id="{0F3AF56F-F289-451F-A107-D207E5C81F76}"/>
               </a:ext>
             </a:extLst>
           </p:cNvPr>
-          <p:cNvSpPr>
-            <a:spLocks noGrp="1"/>
-          </p:cNvSpPr>
+          <p:cNvPicPr>
+            <a:picLocks noGrp="1" noChangeAspect="1"/>
+          </p:cNvPicPr>
           <p:nvPr>
             <p:ph idx="1"/>
           </p:nvPr>
-        </p:nvSpPr>
-        <p:spPr>
-          <a:xfrm>
-            <a:off x="1371600" y="1582310"/>
-            <a:ext cx="9601200" cy="3339547"/>
-          </a:xfrm>
-        </p:spPr>
-        <p:txBody>
-          <a:bodyPr/>
-          <a:lstStyle/>
-          <a:p>
-            <a:r>
-              <a:rPr lang="es-ES" b="1" dirty="0"/>
-              <a:t>Tipo de datos que representa</a:t>
-            </a:r>
-            <a:r>
-              <a:rPr lang="es-ES" dirty="0"/>
-              <a:t>: datos cuantitativos (el cómo varía un determinado valor):</a:t>
-            </a:r>
-          </a:p>
-          <a:p>
-            <a:pPr lvl="1"/>
-            <a:r>
-              <a:rPr lang="es-ES" i="0" dirty="0"/>
-              <a:t>Valor inicial y final son absolutos.</a:t>
-            </a:r>
-          </a:p>
-          <a:p>
-            <a:pPr lvl="1"/>
-            <a:r>
-              <a:rPr lang="es-ES" i="0" dirty="0"/>
-              <a:t>Valores intermedios relativos.</a:t>
-            </a:r>
-          </a:p>
-          <a:p>
-            <a:r>
-              <a:rPr lang="es-ES" b="1" dirty="0"/>
-              <a:t>Estructura de los datos</a:t>
-            </a:r>
-            <a:r>
-              <a:rPr lang="es-ES" dirty="0"/>
-              <a:t>: </a:t>
-            </a:r>
-            <a:r>
-              <a:rPr lang="es-ES" dirty="0" err="1"/>
-              <a:t>datatset</a:t>
-            </a:r>
-            <a:r>
-              <a:rPr lang="es-ES" dirty="0"/>
-              <a:t> tiene que tener un enfoque acumulativo.</a:t>
-            </a:r>
-          </a:p>
-          <a:p>
-            <a:r>
-              <a:rPr lang="es-ES" b="1" dirty="0"/>
-              <a:t>Limitación del juego de datos</a:t>
-            </a:r>
-            <a:r>
-              <a:rPr lang="es-ES" dirty="0"/>
-              <a:t>: sí que hay limitación, el juego de datos tiene que estar acotado (mínimo, máximo).</a:t>
-            </a:r>
-            <a:endParaRPr lang="es-ES" b="1" dirty="0"/>
-          </a:p>
-        </p:txBody>
-      </p:sp>
+        </p:nvPicPr>
+        <p:blipFill>
+          <a:blip r:embed="rId2"/>
+          <a:stretch>
+            <a:fillRect/>
+          </a:stretch>
+        </p:blipFill>
+        <p:spPr>
+          <a:xfrm>
+            <a:off x="2861958" y="1769164"/>
+            <a:ext cx="6468083" cy="4035287"/>
+          </a:xfrm>
+        </p:spPr>
+      </p:pic>
     </p:spTree>
     <p:extLst>
       <p:ext uri="{BB962C8B-B14F-4D97-AF65-F5344CB8AC3E}">
-        <p14:creationId xmlns:p14="http://schemas.microsoft.com/office/powerpoint/2010/main" val="3720959170"/>
+        <p14:creationId xmlns:p14="http://schemas.microsoft.com/office/powerpoint/2010/main" val="4713073"/>
       </p:ext>
     </p:extLst>
   </p:cSld>
@@ -6199,7 +5815,7 @@
           <p:cNvPr id="2" name="Título 1">
             <a:extLst>
               <a:ext uri="{FF2B5EF4-FFF2-40B4-BE49-F238E27FC236}">
-                <a16:creationId xmlns:a16="http://schemas.microsoft.com/office/drawing/2014/main" id="{C975D6E1-9488-4C0E-A451-4F7F4DBA007B}"/>
+                <a16:creationId xmlns:a16="http://schemas.microsoft.com/office/drawing/2014/main" id="{01E19CC7-A49E-424C-81F2-CECE16590C61}"/>
               </a:ext>
             </a:extLst>
           </p:cNvPr>
@@ -6213,7 +5829,7 @@
         <p:spPr>
           <a:xfrm>
             <a:off x="1371600" y="685800"/>
-            <a:ext cx="9601200" cy="721581"/>
+            <a:ext cx="9601200" cy="745435"/>
           </a:xfrm>
         </p:spPr>
         <p:txBody>
@@ -6222,24 +5838,26 @@
           <a:p>
             <a:r>
               <a:rPr lang="es-ES" dirty="0"/>
-              <a:t>Representación del gráfico de cascada</a:t>
+              <a:t>Navegación</a:t>
             </a:r>
           </a:p>
         </p:txBody>
       </p:sp>
       <p:pic>
         <p:nvPicPr>
-          <p:cNvPr id="5" name="Imagen 4">
+          <p:cNvPr id="7" name="Marcador de contenido 6">
             <a:extLst>
               <a:ext uri="{FF2B5EF4-FFF2-40B4-BE49-F238E27FC236}">
-                <a16:creationId xmlns:a16="http://schemas.microsoft.com/office/drawing/2014/main" id="{5338B761-93B4-4561-81E7-5804CF9C3300}"/>
+                <a16:creationId xmlns:a16="http://schemas.microsoft.com/office/drawing/2014/main" id="{D72FEA7E-AB9A-489B-AD6A-766BCED328C7}"/>
               </a:ext>
             </a:extLst>
           </p:cNvPr>
           <p:cNvPicPr>
-            <a:picLocks noChangeAspect="1"/>
+            <a:picLocks noGrp="1" noChangeAspect="1"/>
           </p:cNvPicPr>
-          <p:nvPr/>
+          <p:nvPr>
+            <p:ph idx="1"/>
+          </p:nvPr>
         </p:nvPicPr>
         <p:blipFill>
           <a:blip r:embed="rId2"/>
@@ -6249,18 +5867,15 @@
         </p:blipFill>
         <p:spPr>
           <a:xfrm>
-            <a:off x="2705472" y="1521723"/>
-            <a:ext cx="6781055" cy="5189432"/>
-          </a:xfrm>
-          <a:prstGeom prst="rect">
-            <a:avLst/>
-          </a:prstGeom>
+            <a:off x="2591579" y="1864580"/>
+            <a:ext cx="7008841" cy="3971677"/>
+          </a:xfrm>
         </p:spPr>
       </p:pic>
     </p:spTree>
     <p:extLst>
       <p:ext uri="{BB962C8B-B14F-4D97-AF65-F5344CB8AC3E}">
-        <p14:creationId xmlns:p14="http://schemas.microsoft.com/office/powerpoint/2010/main" val="2644815273"/>
+        <p14:creationId xmlns:p14="http://schemas.microsoft.com/office/powerpoint/2010/main" val="3590661107"/>
       </p:ext>
     </p:extLst>
   </p:cSld>

</xml_diff>